<commit_message>
Typo fixes, poster edits
</commit_message>
<xml_diff>
--- a/Presentation Slide.pptx
+++ b/Presentation Slide.pptx
@@ -3329,168 +3329,214 @@
           <a:chExt cx="0" cy="0"/>
         </a:xfrm>
       </p:grpSpPr>
-      <p:sp useBgFill="1">
-        <p:nvSpPr>
-          <p:cNvPr id="19" name="Rectangle 7">
-            <a:extLst>
-              <a:ext uri="{FF2B5EF4-FFF2-40B4-BE49-F238E27FC236}">
-                <a16:creationId xmlns:a16="http://schemas.microsoft.com/office/drawing/2014/main" id="{35F60170-91B4-45F0-B88B-9C07AEC4642C}"/>
-              </a:ext>
-              <a:ext uri="{C183D7F6-B498-43B3-948B-1728B52AA6E4}">
-                <adec:decorative xmlns:adec="http://schemas.microsoft.com/office/drawing/2017/decorative" val="1"/>
-              </a:ext>
-            </a:extLst>
-          </p:cNvPr>
-          <p:cNvSpPr>
-            <a:spLocks noGrp="1" noRot="1" noChangeAspect="1" noMove="1" noResize="1" noEditPoints="1" noAdjustHandles="1" noChangeArrowheads="1" noChangeShapeType="1" noTextEdit="1"/>
-          </p:cNvSpPr>
-          <p:nvPr>
-            <p:extLst>
-              <p:ext uri="{386F3935-93C4-4BCD-93E2-E3B085C9AB24}">
-                <p16:designElem xmlns:p16="http://schemas.microsoft.com/office/powerpoint/2015/main" val="1"/>
-              </p:ext>
-            </p:extLst>
-          </p:nvPr>
+      <p:sp>
+        <p:nvSpPr>
+          <p:cNvPr id="36" name="Subtitle 2">
+            <a:extLst>
+              <a:ext uri="{FF2B5EF4-FFF2-40B4-BE49-F238E27FC236}">
+                <a16:creationId xmlns:a16="http://schemas.microsoft.com/office/drawing/2014/main" id="{75362A1B-6CA7-40BE-957F-94321FAA7D76}"/>
+              </a:ext>
+            </a:extLst>
+          </p:cNvPr>
+          <p:cNvSpPr txBox="1">
+            <a:spLocks/>
+          </p:cNvSpPr>
+          <p:nvPr/>
         </p:nvSpPr>
         <p:spPr>
           <a:xfrm>
             <a:off x="0" y="0"/>
-            <a:ext cx="12192000" cy="6858001"/>
-          </a:xfrm>
-          <a:prstGeom prst="rect">
-            <a:avLst/>
-          </a:prstGeom>
-          <a:ln>
-            <a:noFill/>
-          </a:ln>
-        </p:spPr>
-        <p:style>
-          <a:lnRef idx="2">
-            <a:schemeClr val="accent1">
-              <a:shade val="50000"/>
-            </a:schemeClr>
-          </a:lnRef>
-          <a:fillRef idx="1">
-            <a:schemeClr val="accent1"/>
-          </a:fillRef>
-          <a:effectRef idx="0">
-            <a:schemeClr val="accent1"/>
-          </a:effectRef>
-          <a:fontRef idx="minor">
-            <a:schemeClr val="lt1"/>
-          </a:fontRef>
-        </p:style>
-        <p:txBody>
-          <a:bodyPr rtlCol="0" anchor="ctr"/>
-          <a:lstStyle/>
-          <a:p>
-            <a:pPr algn="ctr"/>
-            <a:endParaRPr lang="en-US"/>
-          </a:p>
-        </p:txBody>
-      </p:sp>
-      <p:sp>
-        <p:nvSpPr>
-          <p:cNvPr id="20" name="Rectangle 9">
-            <a:extLst>
-              <a:ext uri="{FF2B5EF4-FFF2-40B4-BE49-F238E27FC236}">
-                <a16:creationId xmlns:a16="http://schemas.microsoft.com/office/drawing/2014/main" id="{2C7D7C94-41C0-4614-8A18-941174D4D2AF}"/>
-              </a:ext>
-              <a:ext uri="{C183D7F6-B498-43B3-948B-1728B52AA6E4}">
-                <adec:decorative xmlns:adec="http://schemas.microsoft.com/office/drawing/2017/decorative" val="1"/>
-              </a:ext>
-            </a:extLst>
-          </p:cNvPr>
-          <p:cNvSpPr>
-            <a:spLocks noGrp="1" noRot="1" noChangeAspect="1" noMove="1" noResize="1" noEditPoints="1" noAdjustHandles="1" noChangeArrowheads="1" noChangeShapeType="1" noTextEdit="1"/>
-          </p:cNvSpPr>
-          <p:nvPr>
-            <p:extLst>
-              <p:ext uri="{386F3935-93C4-4BCD-93E2-E3B085C9AB24}">
-                <p16:designElem xmlns:p16="http://schemas.microsoft.com/office/powerpoint/2015/main" val="1"/>
-              </p:ext>
-            </p:extLst>
-          </p:nvPr>
-        </p:nvSpPr>
-        <p:spPr>
-          <a:xfrm>
-            <a:off x="0" y="418"/>
-            <a:ext cx="12192000" cy="6858000"/>
+            <a:ext cx="12192000" cy="6918387"/>
           </a:xfrm>
           <a:prstGeom prst="rect">
             <a:avLst/>
           </a:prstGeom>
           <a:solidFill>
-            <a:schemeClr val="accent1">
-              <a:alpha val="20000"/>
+            <a:schemeClr val="accent5">
+              <a:lumMod val="40000"/>
+              <a:lumOff val="60000"/>
             </a:schemeClr>
           </a:solidFill>
-          <a:ln>
-            <a:noFill/>
-          </a:ln>
         </p:spPr>
-        <p:style>
-          <a:lnRef idx="2">
-            <a:schemeClr val="accent1">
-              <a:shade val="50000"/>
-            </a:schemeClr>
-          </a:lnRef>
-          <a:fillRef idx="1">
-            <a:schemeClr val="accent1"/>
-          </a:fillRef>
-          <a:effectRef idx="0">
-            <a:schemeClr val="accent1"/>
-          </a:effectRef>
-          <a:fontRef idx="minor">
-            <a:schemeClr val="lt1"/>
-          </a:fontRef>
-        </p:style>
-        <p:txBody>
-          <a:bodyPr rtlCol="0" anchor="ctr"/>
-          <a:lstStyle/>
-          <a:p>
-            <a:pPr algn="ctr"/>
-            <a:endParaRPr lang="en-US"/>
-          </a:p>
-        </p:txBody>
-      </p:sp>
-      <p:sp>
-        <p:nvSpPr>
-          <p:cNvPr id="2" name="Title 1">
-            <a:extLst>
-              <a:ext uri="{FF2B5EF4-FFF2-40B4-BE49-F238E27FC236}">
-                <a16:creationId xmlns:a16="http://schemas.microsoft.com/office/drawing/2014/main" id="{F3BF461E-CFB0-4E53-B904-66189B130392}"/>
-              </a:ext>
-            </a:extLst>
-          </p:cNvPr>
-          <p:cNvSpPr>
-            <a:spLocks noGrp="1"/>
-          </p:cNvSpPr>
-          <p:nvPr>
-            <p:ph type="ctrTitle"/>
-          </p:nvPr>
-        </p:nvSpPr>
-        <p:spPr>
-          <a:xfrm>
-            <a:off x="914400" y="163274"/>
-            <a:ext cx="2676088" cy="712066"/>
-          </a:xfrm>
-        </p:spPr>
-        <p:txBody>
-          <a:bodyPr anchor="b">
+        <p:txBody>
+          <a:bodyPr vert="horz" lIns="91440" tIns="45720" rIns="91440" bIns="45720" rtlCol="0" anchor="t">
             <a:normAutofit/>
           </a:bodyPr>
-          <a:lstStyle/>
+          <a:lstStyle>
+            <a:lvl1pPr marL="0" indent="0" algn="ctr" defTabSz="914400" rtl="0" eaLnBrk="1" latinLnBrk="0" hangingPunct="1">
+              <a:lnSpc>
+                <a:spcPct val="90000"/>
+              </a:lnSpc>
+              <a:spcBef>
+                <a:spcPts val="1000"/>
+              </a:spcBef>
+              <a:buFont typeface="Arial" panose="020B0604020202020204" pitchFamily="34" charset="0"/>
+              <a:buNone/>
+              <a:defRPr sz="2400" kern="1200">
+                <a:solidFill>
+                  <a:schemeClr val="tx1"/>
+                </a:solidFill>
+                <a:latin typeface="+mn-lt"/>
+                <a:ea typeface="+mn-ea"/>
+                <a:cs typeface="+mn-cs"/>
+              </a:defRPr>
+            </a:lvl1pPr>
+            <a:lvl2pPr marL="457200" indent="0" algn="ctr" defTabSz="914400" rtl="0" eaLnBrk="1" latinLnBrk="0" hangingPunct="1">
+              <a:lnSpc>
+                <a:spcPct val="90000"/>
+              </a:lnSpc>
+              <a:spcBef>
+                <a:spcPts val="500"/>
+              </a:spcBef>
+              <a:buFont typeface="Arial" panose="020B0604020202020204" pitchFamily="34" charset="0"/>
+              <a:buNone/>
+              <a:defRPr sz="2000" kern="1200">
+                <a:solidFill>
+                  <a:schemeClr val="tx1"/>
+                </a:solidFill>
+                <a:latin typeface="+mn-lt"/>
+                <a:ea typeface="+mn-ea"/>
+                <a:cs typeface="+mn-cs"/>
+              </a:defRPr>
+            </a:lvl2pPr>
+            <a:lvl3pPr marL="914400" indent="0" algn="ctr" defTabSz="914400" rtl="0" eaLnBrk="1" latinLnBrk="0" hangingPunct="1">
+              <a:lnSpc>
+                <a:spcPct val="90000"/>
+              </a:lnSpc>
+              <a:spcBef>
+                <a:spcPts val="500"/>
+              </a:spcBef>
+              <a:buFont typeface="Arial" panose="020B0604020202020204" pitchFamily="34" charset="0"/>
+              <a:buNone/>
+              <a:defRPr sz="1800" kern="1200">
+                <a:solidFill>
+                  <a:schemeClr val="tx1"/>
+                </a:solidFill>
+                <a:latin typeface="+mn-lt"/>
+                <a:ea typeface="+mn-ea"/>
+                <a:cs typeface="+mn-cs"/>
+              </a:defRPr>
+            </a:lvl3pPr>
+            <a:lvl4pPr marL="1371600" indent="0" algn="ctr" defTabSz="914400" rtl="0" eaLnBrk="1" latinLnBrk="0" hangingPunct="1">
+              <a:lnSpc>
+                <a:spcPct val="90000"/>
+              </a:lnSpc>
+              <a:spcBef>
+                <a:spcPts val="500"/>
+              </a:spcBef>
+              <a:buFont typeface="Arial" panose="020B0604020202020204" pitchFamily="34" charset="0"/>
+              <a:buNone/>
+              <a:defRPr sz="1600" kern="1200">
+                <a:solidFill>
+                  <a:schemeClr val="tx1"/>
+                </a:solidFill>
+                <a:latin typeface="+mn-lt"/>
+                <a:ea typeface="+mn-ea"/>
+                <a:cs typeface="+mn-cs"/>
+              </a:defRPr>
+            </a:lvl4pPr>
+            <a:lvl5pPr marL="1828800" indent="0" algn="ctr" defTabSz="914400" rtl="0" eaLnBrk="1" latinLnBrk="0" hangingPunct="1">
+              <a:lnSpc>
+                <a:spcPct val="90000"/>
+              </a:lnSpc>
+              <a:spcBef>
+                <a:spcPts val="500"/>
+              </a:spcBef>
+              <a:buFont typeface="Arial" panose="020B0604020202020204" pitchFamily="34" charset="0"/>
+              <a:buNone/>
+              <a:defRPr sz="1600" kern="1200">
+                <a:solidFill>
+                  <a:schemeClr val="tx1"/>
+                </a:solidFill>
+                <a:latin typeface="+mn-lt"/>
+                <a:ea typeface="+mn-ea"/>
+                <a:cs typeface="+mn-cs"/>
+              </a:defRPr>
+            </a:lvl5pPr>
+            <a:lvl6pPr marL="2286000" indent="0" algn="ctr" defTabSz="914400" rtl="0" eaLnBrk="1" latinLnBrk="0" hangingPunct="1">
+              <a:lnSpc>
+                <a:spcPct val="90000"/>
+              </a:lnSpc>
+              <a:spcBef>
+                <a:spcPts val="500"/>
+              </a:spcBef>
+              <a:buFont typeface="Arial" panose="020B0604020202020204" pitchFamily="34" charset="0"/>
+              <a:buNone/>
+              <a:defRPr sz="1600" kern="1200">
+                <a:solidFill>
+                  <a:schemeClr val="tx1"/>
+                </a:solidFill>
+                <a:latin typeface="+mn-lt"/>
+                <a:ea typeface="+mn-ea"/>
+                <a:cs typeface="+mn-cs"/>
+              </a:defRPr>
+            </a:lvl6pPr>
+            <a:lvl7pPr marL="2743200" indent="0" algn="ctr" defTabSz="914400" rtl="0" eaLnBrk="1" latinLnBrk="0" hangingPunct="1">
+              <a:lnSpc>
+                <a:spcPct val="90000"/>
+              </a:lnSpc>
+              <a:spcBef>
+                <a:spcPts val="500"/>
+              </a:spcBef>
+              <a:buFont typeface="Arial" panose="020B0604020202020204" pitchFamily="34" charset="0"/>
+              <a:buNone/>
+              <a:defRPr sz="1600" kern="1200">
+                <a:solidFill>
+                  <a:schemeClr val="tx1"/>
+                </a:solidFill>
+                <a:latin typeface="+mn-lt"/>
+                <a:ea typeface="+mn-ea"/>
+                <a:cs typeface="+mn-cs"/>
+              </a:defRPr>
+            </a:lvl7pPr>
+            <a:lvl8pPr marL="3200400" indent="0" algn="ctr" defTabSz="914400" rtl="0" eaLnBrk="1" latinLnBrk="0" hangingPunct="1">
+              <a:lnSpc>
+                <a:spcPct val="90000"/>
+              </a:lnSpc>
+              <a:spcBef>
+                <a:spcPts val="500"/>
+              </a:spcBef>
+              <a:buFont typeface="Arial" panose="020B0604020202020204" pitchFamily="34" charset="0"/>
+              <a:buNone/>
+              <a:defRPr sz="1600" kern="1200">
+                <a:solidFill>
+                  <a:schemeClr val="tx1"/>
+                </a:solidFill>
+                <a:latin typeface="+mn-lt"/>
+                <a:ea typeface="+mn-ea"/>
+                <a:cs typeface="+mn-cs"/>
+              </a:defRPr>
+            </a:lvl8pPr>
+            <a:lvl9pPr marL="3657600" indent="0" algn="ctr" defTabSz="914400" rtl="0" eaLnBrk="1" latinLnBrk="0" hangingPunct="1">
+              <a:lnSpc>
+                <a:spcPct val="90000"/>
+              </a:lnSpc>
+              <a:spcBef>
+                <a:spcPts val="500"/>
+              </a:spcBef>
+              <a:buFont typeface="Arial" panose="020B0604020202020204" pitchFamily="34" charset="0"/>
+              <a:buNone/>
+              <a:defRPr sz="1600" kern="1200">
+                <a:solidFill>
+                  <a:schemeClr val="tx1"/>
+                </a:solidFill>
+                <a:latin typeface="+mn-lt"/>
+                <a:ea typeface="+mn-ea"/>
+                <a:cs typeface="+mn-cs"/>
+              </a:defRPr>
+            </a:lvl9pPr>
+          </a:lstStyle>
           <a:p>
             <a:pPr algn="l"/>
-            <a:r>
-              <a:rPr lang="en-US" sz="4000" b="1" dirty="0">
-                <a:solidFill>
-                  <a:schemeClr val="tx2"/>
-                </a:solidFill>
-              </a:rPr>
-              <a:t>Store Sales</a:t>
-            </a:r>
+            <a:endParaRPr lang="en-US" sz="2700" dirty="0">
+              <a:solidFill>
+                <a:schemeClr val="bg2">
+                  <a:lumMod val="10000"/>
+                </a:schemeClr>
+              </a:solidFill>
+              <a:latin typeface="Arial" panose="020B0604020202020204" pitchFamily="34" charset="0"/>
+              <a:cs typeface="Arial" panose="020B0604020202020204" pitchFamily="34" charset="0"/>
+            </a:endParaRPr>
           </a:p>
         </p:txBody>
       </p:sp>
@@ -3512,8 +3558,8 @@
         </p:nvSpPr>
         <p:spPr>
           <a:xfrm>
-            <a:off x="98198" y="958094"/>
-            <a:ext cx="3492290" cy="2800175"/>
+            <a:off x="98197" y="71308"/>
+            <a:ext cx="3441957" cy="3147881"/>
           </a:xfrm>
           <a:solidFill>
             <a:schemeClr val="bg1">
@@ -3523,7 +3569,7 @@
         </p:spPr>
         <p:txBody>
           <a:bodyPr anchor="t">
-            <a:normAutofit fontScale="92500" lnSpcReduction="20000"/>
+            <a:normAutofit fontScale="92500" lnSpcReduction="10000"/>
           </a:bodyPr>
           <a:lstStyle/>
           <a:p>
@@ -3996,248 +4042,6 @@
           </a:p>
         </p:txBody>
       </p:sp>
-      <p:cxnSp>
-        <p:nvCxnSpPr>
-          <p:cNvPr id="21" name="Straight Connector 11">
-            <a:extLst>
-              <a:ext uri="{FF2B5EF4-FFF2-40B4-BE49-F238E27FC236}">
-                <a16:creationId xmlns:a16="http://schemas.microsoft.com/office/drawing/2014/main" id="{61F6FBC1-6409-4059-B87B-1BE513242FE6}"/>
-              </a:ext>
-              <a:ext uri="{C183D7F6-B498-43B3-948B-1728B52AA6E4}">
-                <adec:decorative xmlns:adec="http://schemas.microsoft.com/office/drawing/2017/decorative" val="1"/>
-              </a:ext>
-            </a:extLst>
-          </p:cNvPr>
-          <p:cNvCxnSpPr>
-            <a:cxnSpLocks noGrp="1" noRot="1" noChangeAspect="1" noMove="1" noResize="1" noEditPoints="1" noAdjustHandles="1" noChangeArrowheads="1" noChangeShapeType="1"/>
-          </p:cNvCxnSpPr>
-          <p:nvPr>
-            <p:extLst>
-              <p:ext uri="{386F3935-93C4-4BCD-93E2-E3B085C9AB24}">
-                <p16:designElem xmlns:p16="http://schemas.microsoft.com/office/powerpoint/2015/main" val="1"/>
-              </p:ext>
-            </p:extLst>
-          </p:nvPr>
-        </p:nvCxnSpPr>
-        <p:spPr>
-          <a:xfrm flipH="1">
-            <a:off x="732568" y="246028"/>
-            <a:ext cx="255495" cy="546559"/>
-          </a:xfrm>
-          <a:prstGeom prst="line">
-            <a:avLst/>
-          </a:prstGeom>
-          <a:ln w="12700">
-            <a:solidFill>
-              <a:schemeClr val="tx2"/>
-            </a:solidFill>
-          </a:ln>
-        </p:spPr>
-        <p:style>
-          <a:lnRef idx="1">
-            <a:schemeClr val="accent1"/>
-          </a:lnRef>
-          <a:fillRef idx="0">
-            <a:schemeClr val="accent1"/>
-          </a:fillRef>
-          <a:effectRef idx="0">
-            <a:schemeClr val="accent1"/>
-          </a:effectRef>
-          <a:fontRef idx="minor">
-            <a:schemeClr val="tx1"/>
-          </a:fontRef>
-        </p:style>
-      </p:cxnSp>
-      <p:cxnSp>
-        <p:nvCxnSpPr>
-          <p:cNvPr id="22" name="Straight Connector 13">
-            <a:extLst>
-              <a:ext uri="{FF2B5EF4-FFF2-40B4-BE49-F238E27FC236}">
-                <a16:creationId xmlns:a16="http://schemas.microsoft.com/office/drawing/2014/main" id="{E6A98E26-C7DC-48E3-8F50-FBF7F3C50F4C}"/>
-              </a:ext>
-              <a:ext uri="{C183D7F6-B498-43B3-948B-1728B52AA6E4}">
-                <adec:decorative xmlns:adec="http://schemas.microsoft.com/office/drawing/2017/decorative" val="1"/>
-              </a:ext>
-            </a:extLst>
-          </p:cNvPr>
-          <p:cNvCxnSpPr>
-            <a:cxnSpLocks noGrp="1" noRot="1" noChangeAspect="1" noMove="1" noResize="1" noEditPoints="1" noAdjustHandles="1" noChangeArrowheads="1" noChangeShapeType="1"/>
-          </p:cNvCxnSpPr>
-          <p:nvPr>
-            <p:extLst>
-              <p:ext uri="{386F3935-93C4-4BCD-93E2-E3B085C9AB24}">
-                <p16:designElem xmlns:p16="http://schemas.microsoft.com/office/powerpoint/2015/main" val="1"/>
-              </p:ext>
-            </p:extLst>
-          </p:nvPr>
-        </p:nvCxnSpPr>
-        <p:spPr>
-          <a:xfrm flipH="1">
-            <a:off x="840441" y="6522756"/>
-            <a:ext cx="10717187" cy="0"/>
-          </a:xfrm>
-          <a:prstGeom prst="line">
-            <a:avLst/>
-          </a:prstGeom>
-          <a:ln w="12700" cap="sq">
-            <a:solidFill>
-              <a:schemeClr val="tx2"/>
-            </a:solidFill>
-            <a:headEnd type="none"/>
-            <a:tailEnd type="none"/>
-          </a:ln>
-        </p:spPr>
-        <p:style>
-          <a:lnRef idx="1">
-            <a:schemeClr val="accent1"/>
-          </a:lnRef>
-          <a:fillRef idx="0">
-            <a:schemeClr val="accent1"/>
-          </a:fillRef>
-          <a:effectRef idx="0">
-            <a:schemeClr val="accent1"/>
-          </a:effectRef>
-          <a:fontRef idx="minor">
-            <a:schemeClr val="tx1"/>
-          </a:fontRef>
-        </p:style>
-      </p:cxnSp>
-      <p:grpSp>
-        <p:nvGrpSpPr>
-          <p:cNvPr id="16" name="Group 15">
-            <a:extLst>
-              <a:ext uri="{FF2B5EF4-FFF2-40B4-BE49-F238E27FC236}">
-                <a16:creationId xmlns:a16="http://schemas.microsoft.com/office/drawing/2014/main" id="{65B3D45F-509E-43F3-B685-A5E78AD0D820}"/>
-              </a:ext>
-              <a:ext uri="{C183D7F6-B498-43B3-948B-1728B52AA6E4}">
-                <adec:decorative xmlns:adec="http://schemas.microsoft.com/office/drawing/2017/decorative" val="1"/>
-              </a:ext>
-            </a:extLst>
-          </p:cNvPr>
-          <p:cNvGrpSpPr>
-            <a:grpSpLocks noGrp="1" noUngrp="1" noRot="1" noChangeAspect="1" noMove="1" noResize="1"/>
-          </p:cNvGrpSpPr>
-          <p:nvPr>
-            <p:extLst>
-              <p:ext uri="{386F3935-93C4-4BCD-93E2-E3B085C9AB24}">
-                <p16:designElem xmlns:p16="http://schemas.microsoft.com/office/powerpoint/2015/main" val="1"/>
-              </p:ext>
-            </p:extLst>
-          </p:nvPr>
-        </p:nvGrpSpPr>
-        <p:grpSpPr>
-          <a:xfrm>
-            <a:off x="12829917" y="6400800"/>
-            <a:ext cx="338328" cy="240175"/>
-            <a:chOff x="4089400" y="933450"/>
-            <a:chExt cx="338328" cy="341938"/>
-          </a:xfrm>
-        </p:grpSpPr>
-        <p:cxnSp>
-          <p:nvCxnSpPr>
-            <p:cNvPr id="17" name="Straight Connector 16">
-              <a:extLst>
-                <a:ext uri="{FF2B5EF4-FFF2-40B4-BE49-F238E27FC236}">
-                  <a16:creationId xmlns:a16="http://schemas.microsoft.com/office/drawing/2014/main" id="{6C53B0F8-0414-437D-87C2-23F48DF9CE3C}"/>
-                </a:ext>
-                <a:ext uri="{C183D7F6-B498-43B3-948B-1728B52AA6E4}">
-                  <adec:decorative xmlns:adec="http://schemas.microsoft.com/office/drawing/2017/decorative" val="1"/>
-                </a:ext>
-              </a:extLst>
-            </p:cNvPr>
-            <p:cNvCxnSpPr>
-              <a:cxnSpLocks/>
-            </p:cNvCxnSpPr>
-            <p:nvPr>
-              <p:extLst>
-                <p:ext uri="{386F3935-93C4-4BCD-93E2-E3B085C9AB24}">
-                  <p16:designElem xmlns:p16="http://schemas.microsoft.com/office/powerpoint/2015/main" val="1"/>
-                </p:ext>
-              </p:extLst>
-            </p:nvPr>
-          </p:nvCxnSpPr>
-          <p:spPr>
-            <a:xfrm>
-              <a:off x="4258564" y="933450"/>
-              <a:ext cx="0" cy="341938"/>
-            </a:xfrm>
-            <a:prstGeom prst="line">
-              <a:avLst/>
-            </a:prstGeom>
-            <a:ln w="12700">
-              <a:solidFill>
-                <a:schemeClr val="tx2"/>
-              </a:solidFill>
-            </a:ln>
-          </p:spPr>
-          <p:style>
-            <a:lnRef idx="1">
-              <a:schemeClr val="accent1"/>
-            </a:lnRef>
-            <a:fillRef idx="0">
-              <a:schemeClr val="accent1"/>
-            </a:fillRef>
-            <a:effectRef idx="0">
-              <a:schemeClr val="accent1"/>
-            </a:effectRef>
-            <a:fontRef idx="minor">
-              <a:schemeClr val="tx1"/>
-            </a:fontRef>
-          </p:style>
-        </p:cxnSp>
-        <p:cxnSp>
-          <p:nvCxnSpPr>
-            <p:cNvPr id="18" name="Straight Connector 17">
-              <a:extLst>
-                <a:ext uri="{FF2B5EF4-FFF2-40B4-BE49-F238E27FC236}">
-                  <a16:creationId xmlns:a16="http://schemas.microsoft.com/office/drawing/2014/main" id="{30B56551-40C7-4552-A11A-6D86B7EB085B}"/>
-                </a:ext>
-                <a:ext uri="{C183D7F6-B498-43B3-948B-1728B52AA6E4}">
-                  <adec:decorative xmlns:adec="http://schemas.microsoft.com/office/drawing/2017/decorative" val="1"/>
-                </a:ext>
-              </a:extLst>
-            </p:cNvPr>
-            <p:cNvCxnSpPr>
-              <a:cxnSpLocks/>
-            </p:cNvCxnSpPr>
-            <p:nvPr>
-              <p:extLst>
-                <p:ext uri="{386F3935-93C4-4BCD-93E2-E3B085C9AB24}">
-                  <p16:designElem xmlns:p16="http://schemas.microsoft.com/office/powerpoint/2015/main" val="1"/>
-                </p:ext>
-              </p:extLst>
-            </p:nvPr>
-          </p:nvCxnSpPr>
-          <p:spPr>
-            <a:xfrm>
-              <a:off x="4089400" y="1104419"/>
-              <a:ext cx="338328" cy="0"/>
-            </a:xfrm>
-            <a:prstGeom prst="line">
-              <a:avLst/>
-            </a:prstGeom>
-            <a:ln w="12700">
-              <a:solidFill>
-                <a:schemeClr val="tx2"/>
-              </a:solidFill>
-            </a:ln>
-          </p:spPr>
-          <p:style>
-            <a:lnRef idx="1">
-              <a:schemeClr val="accent1"/>
-            </a:lnRef>
-            <a:fillRef idx="0">
-              <a:schemeClr val="accent1"/>
-            </a:fillRef>
-            <a:effectRef idx="0">
-              <a:schemeClr val="accent1"/>
-            </a:effectRef>
-            <a:fontRef idx="minor">
-              <a:schemeClr val="tx1"/>
-            </a:fontRef>
-          </p:style>
-        </p:cxnSp>
-      </p:grpSp>
       <mc:AlternateContent xmlns:mc="http://schemas.openxmlformats.org/markup-compatibility/2006">
         <mc:Choice xmlns:a14="http://schemas.microsoft.com/office/drawing/2010/main" Requires="a14">
           <p:sp>
@@ -4256,8 +4060,8 @@
             </p:nvSpPr>
             <p:spPr>
               <a:xfrm>
-                <a:off x="9337624" y="2756803"/>
-                <a:ext cx="2756177" cy="3643997"/>
+                <a:off x="9337624" y="2710351"/>
+                <a:ext cx="2756177" cy="3690449"/>
               </a:xfrm>
               <a:prstGeom prst="rect">
                 <a:avLst/>
@@ -5130,8 +4934,8 @@
             </p:nvSpPr>
             <p:spPr>
               <a:xfrm>
-                <a:off x="9337624" y="2756803"/>
-                <a:ext cx="2756177" cy="3643997"/>
+                <a:off x="9337624" y="2710351"/>
+                <a:ext cx="2756177" cy="3690449"/>
               </a:xfrm>
               <a:prstGeom prst="rect">
                 <a:avLst/>
@@ -5139,7 +4943,7 @@
               <a:blipFill>
                 <a:blip r:embed="rId2"/>
                 <a:stretch>
-                  <a:fillRect l="-2212" t="-3177"/>
+                  <a:fillRect l="-2212" t="-3140"/>
                 </a:stretch>
               </a:blipFill>
             </p:spPr>
@@ -5160,10 +4964,10 @@
       </mc:AlternateContent>
       <p:sp>
         <p:nvSpPr>
-          <p:cNvPr id="26" name="Subtitle 2">
-            <a:extLst>
-              <a:ext uri="{FF2B5EF4-FFF2-40B4-BE49-F238E27FC236}">
-                <a16:creationId xmlns:a16="http://schemas.microsoft.com/office/drawing/2014/main" id="{1508142D-7CC5-4AA0-A0F1-1DEFE1AF6B39}"/>
+          <p:cNvPr id="27" name="Subtitle 2">
+            <a:extLst>
+              <a:ext uri="{FF2B5EF4-FFF2-40B4-BE49-F238E27FC236}">
+                <a16:creationId xmlns:a16="http://schemas.microsoft.com/office/drawing/2014/main" id="{805633AB-60E9-459E-9153-47F98CF2BD10}"/>
               </a:ext>
             </a:extLst>
           </p:cNvPr>
@@ -5174,8 +4978,8 @@
         </p:nvSpPr>
         <p:spPr>
           <a:xfrm>
-            <a:off x="3688686" y="246755"/>
-            <a:ext cx="5550737" cy="4891889"/>
+            <a:off x="98197" y="3341169"/>
+            <a:ext cx="3441957" cy="3059612"/>
           </a:xfrm>
           <a:prstGeom prst="rect">
             <a:avLst/>
@@ -5357,7 +5161,7 @@
           <a:p>
             <a:pPr algn="l"/>
             <a:r>
-              <a:rPr lang="en-US" sz="1900" u="sng" dirty="0">
+              <a:rPr lang="en-US" sz="1800" u="sng" dirty="0">
                 <a:solidFill>
                   <a:schemeClr val="bg2">
                     <a:lumMod val="10000"/>
@@ -5366,7 +5170,7 @@
                 <a:latin typeface="Arial" panose="020B0604020202020204" pitchFamily="34" charset="0"/>
                 <a:cs typeface="Arial" panose="020B0604020202020204" pitchFamily="34" charset="0"/>
               </a:rPr>
-              <a:t>Data Exploration &amp; Preprocessing</a:t>
+              <a:t>Other Included Data</a:t>
             </a:r>
             <a:r>
               <a:rPr lang="en-US" sz="1800" dirty="0">
@@ -5384,7 +5188,7 @@
           <a:p>
             <a:pPr algn="l"/>
             <a:r>
-              <a:rPr lang="en-US" sz="1800" dirty="0">
+              <a:rPr lang="en-US" sz="1300" b="1" dirty="0">
                 <a:solidFill>
                   <a:schemeClr val="bg2">
                     <a:lumMod val="10000"/>
@@ -5393,17 +5197,190 @@
                 <a:latin typeface="Arial" panose="020B0604020202020204" pitchFamily="34" charset="0"/>
                 <a:cs typeface="Arial" panose="020B0604020202020204" pitchFamily="34" charset="0"/>
               </a:rPr>
-              <a:t>Graphs</a:t>
-            </a:r>
-          </a:p>
-        </p:txBody>
-      </p:sp>
-      <p:sp>
-        <p:nvSpPr>
-          <p:cNvPr id="27" name="Subtitle 2">
-            <a:extLst>
-              <a:ext uri="{FF2B5EF4-FFF2-40B4-BE49-F238E27FC236}">
-                <a16:creationId xmlns:a16="http://schemas.microsoft.com/office/drawing/2014/main" id="{805633AB-60E9-459E-9153-47F98CF2BD10}"/>
+              <a:t>Oil Prices</a:t>
+            </a:r>
+            <a:br>
+              <a:rPr lang="en-US" sz="1300" b="1" dirty="0">
+                <a:solidFill>
+                  <a:schemeClr val="bg2">
+                    <a:lumMod val="10000"/>
+                  </a:schemeClr>
+                </a:solidFill>
+                <a:latin typeface="Arial" panose="020B0604020202020204" pitchFamily="34" charset="0"/>
+                <a:cs typeface="Arial" panose="020B0604020202020204" pitchFamily="34" charset="0"/>
+              </a:rPr>
+            </a:br>
+            <a:r>
+              <a:rPr lang="en-US" sz="1300" dirty="0">
+                <a:solidFill>
+                  <a:schemeClr val="bg2">
+                    <a:lumMod val="10000"/>
+                  </a:schemeClr>
+                </a:solidFill>
+                <a:latin typeface="Arial" panose="020B0604020202020204" pitchFamily="34" charset="0"/>
+                <a:cs typeface="Arial" panose="020B0604020202020204" pitchFamily="34" charset="0"/>
+              </a:rPr>
+              <a:t>Ecuador’s economy heavily relies on oil trade, influencing market prices on groceries</a:t>
+            </a:r>
+            <a:endParaRPr lang="en-US" sz="1300" b="1" dirty="0">
+              <a:solidFill>
+                <a:schemeClr val="bg2">
+                  <a:lumMod val="10000"/>
+                </a:schemeClr>
+              </a:solidFill>
+              <a:latin typeface="Arial" panose="020B0604020202020204" pitchFamily="34" charset="0"/>
+              <a:cs typeface="Arial" panose="020B0604020202020204" pitchFamily="34" charset="0"/>
+            </a:endParaRPr>
+          </a:p>
+          <a:p>
+            <a:pPr algn="l"/>
+            <a:r>
+              <a:rPr lang="en-US" sz="1300" b="1" dirty="0">
+                <a:solidFill>
+                  <a:schemeClr val="bg2">
+                    <a:lumMod val="10000"/>
+                  </a:schemeClr>
+                </a:solidFill>
+                <a:latin typeface="Arial" panose="020B0604020202020204" pitchFamily="34" charset="0"/>
+                <a:cs typeface="Arial" panose="020B0604020202020204" pitchFamily="34" charset="0"/>
+              </a:rPr>
+              <a:t>Holiday Events</a:t>
+            </a:r>
+            <a:br>
+              <a:rPr lang="en-US" sz="1300" b="1" dirty="0">
+                <a:solidFill>
+                  <a:schemeClr val="bg2">
+                    <a:lumMod val="10000"/>
+                  </a:schemeClr>
+                </a:solidFill>
+                <a:latin typeface="Arial" panose="020B0604020202020204" pitchFamily="34" charset="0"/>
+                <a:cs typeface="Arial" panose="020B0604020202020204" pitchFamily="34" charset="0"/>
+              </a:rPr>
+            </a:br>
+            <a:r>
+              <a:rPr lang="en-US" sz="1300" dirty="0">
+                <a:solidFill>
+                  <a:schemeClr val="bg2">
+                    <a:lumMod val="10000"/>
+                  </a:schemeClr>
+                </a:solidFill>
+                <a:latin typeface="Arial" panose="020B0604020202020204" pitchFamily="34" charset="0"/>
+                <a:cs typeface="Arial" panose="020B0604020202020204" pitchFamily="34" charset="0"/>
+              </a:rPr>
+              <a:t>Any local or national holidays that likely influence sales and other transaction data</a:t>
+            </a:r>
+            <a:endParaRPr lang="en-US" sz="1300" b="1" dirty="0">
+              <a:solidFill>
+                <a:schemeClr val="bg2">
+                  <a:lumMod val="10000"/>
+                </a:schemeClr>
+              </a:solidFill>
+              <a:latin typeface="Arial" panose="020B0604020202020204" pitchFamily="34" charset="0"/>
+              <a:cs typeface="Arial" panose="020B0604020202020204" pitchFamily="34" charset="0"/>
+            </a:endParaRPr>
+          </a:p>
+          <a:p>
+            <a:pPr algn="l"/>
+            <a:r>
+              <a:rPr lang="en-US" sz="1300" b="1" dirty="0">
+                <a:solidFill>
+                  <a:schemeClr val="bg2">
+                    <a:lumMod val="10000"/>
+                  </a:schemeClr>
+                </a:solidFill>
+                <a:latin typeface="Arial" panose="020B0604020202020204" pitchFamily="34" charset="0"/>
+                <a:cs typeface="Arial" panose="020B0604020202020204" pitchFamily="34" charset="0"/>
+              </a:rPr>
+              <a:t>Transactions</a:t>
+            </a:r>
+            <a:br>
+              <a:rPr lang="en-US" sz="1300" b="1" dirty="0">
+                <a:solidFill>
+                  <a:schemeClr val="bg2">
+                    <a:lumMod val="10000"/>
+                  </a:schemeClr>
+                </a:solidFill>
+                <a:latin typeface="Arial" panose="020B0604020202020204" pitchFamily="34" charset="0"/>
+                <a:cs typeface="Arial" panose="020B0604020202020204" pitchFamily="34" charset="0"/>
+              </a:rPr>
+            </a:br>
+            <a:r>
+              <a:rPr lang="en-US" sz="1300" dirty="0">
+                <a:solidFill>
+                  <a:schemeClr val="bg2">
+                    <a:lumMod val="10000"/>
+                  </a:schemeClr>
+                </a:solidFill>
+                <a:latin typeface="Arial" panose="020B0604020202020204" pitchFamily="34" charset="0"/>
+                <a:cs typeface="Arial" panose="020B0604020202020204" pitchFamily="34" charset="0"/>
+              </a:rPr>
+              <a:t>General sales trends for each store, useful for normalizing sales numbers per store</a:t>
+            </a:r>
+            <a:endParaRPr lang="en-US" sz="1300" b="1" dirty="0">
+              <a:solidFill>
+                <a:schemeClr val="bg2">
+                  <a:lumMod val="10000"/>
+                </a:schemeClr>
+              </a:solidFill>
+              <a:latin typeface="Arial" panose="020B0604020202020204" pitchFamily="34" charset="0"/>
+              <a:cs typeface="Arial" panose="020B0604020202020204" pitchFamily="34" charset="0"/>
+            </a:endParaRPr>
+          </a:p>
+          <a:p>
+            <a:pPr algn="l"/>
+            <a:r>
+              <a:rPr lang="en-US" sz="1300" b="1" dirty="0">
+                <a:solidFill>
+                  <a:schemeClr val="bg2">
+                    <a:lumMod val="10000"/>
+                  </a:schemeClr>
+                </a:solidFill>
+                <a:latin typeface="Arial" panose="020B0604020202020204" pitchFamily="34" charset="0"/>
+                <a:cs typeface="Arial" panose="020B0604020202020204" pitchFamily="34" charset="0"/>
+              </a:rPr>
+              <a:t>Stores</a:t>
+            </a:r>
+            <a:br>
+              <a:rPr lang="en-US" sz="1300" b="1" dirty="0">
+                <a:solidFill>
+                  <a:schemeClr val="bg2">
+                    <a:lumMod val="10000"/>
+                  </a:schemeClr>
+                </a:solidFill>
+                <a:latin typeface="Arial" panose="020B0604020202020204" pitchFamily="34" charset="0"/>
+                <a:cs typeface="Arial" panose="020B0604020202020204" pitchFamily="34" charset="0"/>
+              </a:rPr>
+            </a:br>
+            <a:r>
+              <a:rPr lang="en-US" sz="1300" dirty="0">
+                <a:solidFill>
+                  <a:schemeClr val="bg2">
+                    <a:lumMod val="10000"/>
+                  </a:schemeClr>
+                </a:solidFill>
+                <a:latin typeface="Arial" panose="020B0604020202020204" pitchFamily="34" charset="0"/>
+                <a:cs typeface="Arial" panose="020B0604020202020204" pitchFamily="34" charset="0"/>
+              </a:rPr>
+              <a:t>Location, size, and other logistical information about each store</a:t>
+            </a:r>
+            <a:endParaRPr lang="en-US" sz="1300" b="1" dirty="0">
+              <a:solidFill>
+                <a:schemeClr val="bg2">
+                  <a:lumMod val="10000"/>
+                </a:schemeClr>
+              </a:solidFill>
+              <a:latin typeface="Arial" panose="020B0604020202020204" pitchFamily="34" charset="0"/>
+              <a:cs typeface="Arial" panose="020B0604020202020204" pitchFamily="34" charset="0"/>
+            </a:endParaRPr>
+          </a:p>
+        </p:txBody>
+      </p:sp>
+      <p:sp>
+        <p:nvSpPr>
+          <p:cNvPr id="28" name="Subtitle 2">
+            <a:extLst>
+              <a:ext uri="{FF2B5EF4-FFF2-40B4-BE49-F238E27FC236}">
+                <a16:creationId xmlns:a16="http://schemas.microsoft.com/office/drawing/2014/main" id="{C5F4B2D7-5E67-4C53-A4F3-DF41CF893BBC}"/>
               </a:ext>
             </a:extLst>
           </p:cNvPr>
@@ -5414,8 +5391,8 @@
         </p:nvSpPr>
         <p:spPr>
           <a:xfrm>
-            <a:off x="98198" y="3885227"/>
-            <a:ext cx="3492290" cy="2515554"/>
+            <a:off x="3638351" y="2710351"/>
+            <a:ext cx="2756177" cy="2441086"/>
           </a:xfrm>
           <a:prstGeom prst="rect">
             <a:avLst/>
@@ -5597,7 +5574,7 @@
           <a:p>
             <a:pPr algn="l"/>
             <a:r>
-              <a:rPr lang="en-US" sz="1800" u="sng">
+              <a:rPr lang="en-US" sz="1900" u="sng" dirty="0">
                 <a:solidFill>
                   <a:schemeClr val="bg2">
                     <a:lumMod val="10000"/>
@@ -5609,7 +5586,7 @@
               <a:t>Another Topic</a:t>
             </a:r>
             <a:r>
-              <a:rPr lang="en-US" sz="1800">
+              <a:rPr lang="en-US" sz="2700" dirty="0">
                 <a:solidFill>
                   <a:schemeClr val="bg2">
                     <a:lumMod val="10000"/>
@@ -5620,36 +5597,15 @@
               </a:rPr>
               <a:t>:</a:t>
             </a:r>
-            <a:endParaRPr lang="en-US" sz="1800" dirty="0">
-              <a:solidFill>
-                <a:schemeClr val="bg2">
-                  <a:lumMod val="10000"/>
-                </a:schemeClr>
-              </a:solidFill>
-              <a:latin typeface="Arial" panose="020B0604020202020204" pitchFamily="34" charset="0"/>
-              <a:cs typeface="Arial" panose="020B0604020202020204" pitchFamily="34" charset="0"/>
-            </a:endParaRPr>
-          </a:p>
-          <a:p>
-            <a:pPr algn="l"/>
-            <a:endParaRPr lang="en-US" sz="1800" dirty="0">
-              <a:solidFill>
-                <a:schemeClr val="bg2">
-                  <a:lumMod val="10000"/>
-                </a:schemeClr>
-              </a:solidFill>
-              <a:latin typeface="Arial" panose="020B0604020202020204" pitchFamily="34" charset="0"/>
-              <a:cs typeface="Arial" panose="020B0604020202020204" pitchFamily="34" charset="0"/>
-            </a:endParaRPr>
-          </a:p>
-        </p:txBody>
-      </p:sp>
-      <p:sp>
-        <p:nvSpPr>
-          <p:cNvPr id="28" name="Subtitle 2">
-            <a:extLst>
-              <a:ext uri="{FF2B5EF4-FFF2-40B4-BE49-F238E27FC236}">
-                <a16:creationId xmlns:a16="http://schemas.microsoft.com/office/drawing/2014/main" id="{C5F4B2D7-5E67-4C53-A4F3-DF41CF893BBC}"/>
+          </a:p>
+        </p:txBody>
+      </p:sp>
+      <p:sp>
+        <p:nvSpPr>
+          <p:cNvPr id="29" name="Subtitle 2">
+            <a:extLst>
+              <a:ext uri="{FF2B5EF4-FFF2-40B4-BE49-F238E27FC236}">
+                <a16:creationId xmlns:a16="http://schemas.microsoft.com/office/drawing/2014/main" id="{B7F45D5D-04B6-4EF3-9B19-7662FDCE21B6}"/>
               </a:ext>
             </a:extLst>
           </p:cNvPr>
@@ -5660,8 +5616,8 @@
         </p:nvSpPr>
         <p:spPr>
           <a:xfrm>
-            <a:off x="9337623" y="246028"/>
-            <a:ext cx="2756177" cy="2388819"/>
+            <a:off x="3638351" y="5259898"/>
+            <a:ext cx="5601074" cy="1140878"/>
           </a:xfrm>
           <a:prstGeom prst="rect">
             <a:avLst/>
@@ -5674,7 +5630,7 @@
         </p:spPr>
         <p:txBody>
           <a:bodyPr vert="horz" lIns="91440" tIns="45720" rIns="91440" bIns="45720" rtlCol="0" anchor="t">
-            <a:normAutofit/>
+            <a:normAutofit fontScale="70000" lnSpcReduction="20000"/>
           </a:bodyPr>
           <a:lstStyle>
             <a:lvl1pPr marL="0" indent="0" algn="ctr" defTabSz="914400" rtl="0" eaLnBrk="1" latinLnBrk="0" hangingPunct="1">
@@ -5843,7 +5799,7 @@
           <a:p>
             <a:pPr algn="l"/>
             <a:r>
-              <a:rPr lang="en-US" sz="1900" u="sng" dirty="0">
+              <a:rPr lang="en-US" sz="2700" u="sng" dirty="0">
                 <a:solidFill>
                   <a:schemeClr val="bg2">
                     <a:lumMod val="10000"/>
@@ -5852,7 +5808,7 @@
                 <a:latin typeface="Arial" panose="020B0604020202020204" pitchFamily="34" charset="0"/>
                 <a:cs typeface="Arial" panose="020B0604020202020204" pitchFamily="34" charset="0"/>
               </a:rPr>
-              <a:t>Another Topic</a:t>
+              <a:t>Anomalous Data</a:t>
             </a:r>
             <a:r>
               <a:rPr lang="en-US" sz="2700" dirty="0">
@@ -5867,14 +5823,44 @@
               <a:t>:</a:t>
             </a:r>
           </a:p>
-        </p:txBody>
-      </p:sp>
-      <p:sp>
-        <p:nvSpPr>
-          <p:cNvPr id="29" name="Subtitle 2">
-            <a:extLst>
-              <a:ext uri="{FF2B5EF4-FFF2-40B4-BE49-F238E27FC236}">
-                <a16:creationId xmlns:a16="http://schemas.microsoft.com/office/drawing/2014/main" id="{B7F45D5D-04B6-4EF3-9B19-7662FDCE21B6}"/>
+          <a:p>
+            <a:pPr algn="l"/>
+            <a:r>
+              <a:rPr lang="en-US" sz="1900" dirty="0">
+                <a:solidFill>
+                  <a:schemeClr val="bg2">
+                    <a:lumMod val="10000"/>
+                  </a:schemeClr>
+                </a:solidFill>
+                <a:latin typeface="Arial" panose="020B0604020202020204" pitchFamily="34" charset="0"/>
+                <a:cs typeface="Arial" panose="020B0604020202020204" pitchFamily="34" charset="0"/>
+              </a:rPr>
+              <a:t>A major earthquake struck Ecuador on April 16, 2016 which effected sales prices for a number of weeks.</a:t>
+            </a:r>
+          </a:p>
+          <a:p>
+            <a:pPr algn="l"/>
+            <a:r>
+              <a:rPr lang="en-US" sz="1900" dirty="0">
+                <a:solidFill>
+                  <a:schemeClr val="bg2">
+                    <a:lumMod val="10000"/>
+                  </a:schemeClr>
+                </a:solidFill>
+                <a:latin typeface="Arial" panose="020B0604020202020204" pitchFamily="34" charset="0"/>
+                <a:cs typeface="Arial" panose="020B0604020202020204" pitchFamily="34" charset="0"/>
+              </a:rPr>
+              <a:t>We tested with a smaller set of data (see 2017 Data Only model) to see the effect on the model’s performance.</a:t>
+            </a:r>
+          </a:p>
+        </p:txBody>
+      </p:sp>
+      <p:sp>
+        <p:nvSpPr>
+          <p:cNvPr id="30" name="Title 1">
+            <a:extLst>
+              <a:ext uri="{FF2B5EF4-FFF2-40B4-BE49-F238E27FC236}">
+                <a16:creationId xmlns:a16="http://schemas.microsoft.com/office/drawing/2014/main" id="{5F9659AD-4E67-419D-A158-EA131C7DE220}"/>
               </a:ext>
             </a:extLst>
           </p:cNvPr>
@@ -5885,8 +5871,67 @@
         </p:nvSpPr>
         <p:spPr>
           <a:xfrm>
-            <a:off x="3688684" y="5259898"/>
-            <a:ext cx="5550741" cy="1140878"/>
+            <a:off x="8464492" y="6520888"/>
+            <a:ext cx="3142235" cy="336693"/>
+          </a:xfrm>
+          <a:prstGeom prst="rect">
+            <a:avLst/>
+          </a:prstGeom>
+        </p:spPr>
+        <p:txBody>
+          <a:bodyPr vert="horz" lIns="91440" tIns="45720" rIns="91440" bIns="45720" rtlCol="0" anchor="b">
+            <a:normAutofit fontScale="47500" lnSpcReduction="20000"/>
+          </a:bodyPr>
+          <a:lstStyle>
+            <a:lvl1pPr algn="ctr" defTabSz="914400" rtl="0" eaLnBrk="1" latinLnBrk="0" hangingPunct="1">
+              <a:lnSpc>
+                <a:spcPct val="90000"/>
+              </a:lnSpc>
+              <a:spcBef>
+                <a:spcPct val="0"/>
+              </a:spcBef>
+              <a:buNone/>
+              <a:defRPr sz="6000" kern="1200">
+                <a:solidFill>
+                  <a:schemeClr val="tx1"/>
+                </a:solidFill>
+                <a:latin typeface="+mj-lt"/>
+                <a:ea typeface="+mj-ea"/>
+                <a:cs typeface="+mj-cs"/>
+              </a:defRPr>
+            </a:lvl1pPr>
+          </a:lstStyle>
+          <a:p>
+            <a:pPr algn="r"/>
+            <a:r>
+              <a:rPr lang="en-US" sz="4000" dirty="0">
+                <a:solidFill>
+                  <a:schemeClr val="tx2"/>
+                </a:solidFill>
+              </a:rPr>
+              <a:t>Corbin Park, Charisse Spencer</a:t>
+            </a:r>
+          </a:p>
+        </p:txBody>
+      </p:sp>
+      <p:sp>
+        <p:nvSpPr>
+          <p:cNvPr id="26" name="Subtitle 2">
+            <a:extLst>
+              <a:ext uri="{FF2B5EF4-FFF2-40B4-BE49-F238E27FC236}">
+                <a16:creationId xmlns:a16="http://schemas.microsoft.com/office/drawing/2014/main" id="{1508142D-7CC5-4AA0-A0F1-1DEFE1AF6B39}"/>
+              </a:ext>
+            </a:extLst>
+          </p:cNvPr>
+          <p:cNvSpPr txBox="1">
+            <a:spLocks/>
+          </p:cNvSpPr>
+          <p:nvPr/>
+        </p:nvSpPr>
+        <p:spPr>
+          <a:xfrm>
+            <a:off x="3638351" y="71308"/>
+            <a:ext cx="8455450" cy="2563540"/>
           </a:xfrm>
           <a:prstGeom prst="rect">
             <a:avLst/>
@@ -5899,7 +5944,7 @@
         </p:spPr>
         <p:txBody>
           <a:bodyPr vert="horz" lIns="91440" tIns="45720" rIns="91440" bIns="45720" rtlCol="0" anchor="t">
-            <a:normAutofit fontScale="70000" lnSpcReduction="20000"/>
+            <a:normAutofit/>
           </a:bodyPr>
           <a:lstStyle>
             <a:lvl1pPr marL="0" indent="0" algn="ctr" defTabSz="914400" rtl="0" eaLnBrk="1" latinLnBrk="0" hangingPunct="1">
@@ -6068,7 +6113,7 @@
           <a:p>
             <a:pPr algn="l"/>
             <a:r>
-              <a:rPr lang="en-US" sz="2700" u="sng" dirty="0">
+              <a:rPr lang="en-US" sz="1900" u="sng" dirty="0">
                 <a:solidFill>
                   <a:schemeClr val="bg2">
                     <a:lumMod val="10000"/>
@@ -6077,10 +6122,10 @@
                 <a:latin typeface="Arial" panose="020B0604020202020204" pitchFamily="34" charset="0"/>
                 <a:cs typeface="Arial" panose="020B0604020202020204" pitchFamily="34" charset="0"/>
               </a:rPr>
-              <a:t>Anomalous Data</a:t>
-            </a:r>
-            <a:r>
-              <a:rPr lang="en-US" sz="2700" dirty="0">
+              <a:t>Data Exploration &amp; Preprocessing</a:t>
+            </a:r>
+            <a:r>
+              <a:rPr lang="en-US" sz="1800" dirty="0">
                 <a:solidFill>
                   <a:schemeClr val="bg2">
                     <a:lumMod val="10000"/>
@@ -6094,62 +6139,102 @@
           </a:p>
           <a:p>
             <a:pPr algn="l"/>
-            <a:r>
-              <a:rPr lang="en-US" sz="1900" dirty="0">
-                <a:solidFill>
-                  <a:schemeClr val="bg2">
-                    <a:lumMod val="10000"/>
-                  </a:schemeClr>
-                </a:solidFill>
-                <a:latin typeface="Arial" panose="020B0604020202020204" pitchFamily="34" charset="0"/>
-                <a:cs typeface="Arial" panose="020B0604020202020204" pitchFamily="34" charset="0"/>
-              </a:rPr>
-              <a:t>A major earthquake struck Ecuador on April 16, 2016 which effected sales prices for a number of weeks.</a:t>
-            </a:r>
-          </a:p>
-          <a:p>
-            <a:pPr algn="l"/>
-            <a:r>
-              <a:rPr lang="en-US" sz="1900" dirty="0">
-                <a:solidFill>
-                  <a:schemeClr val="bg2">
-                    <a:lumMod val="10000"/>
-                  </a:schemeClr>
-                </a:solidFill>
-                <a:latin typeface="Arial" panose="020B0604020202020204" pitchFamily="34" charset="0"/>
-                <a:cs typeface="Arial" panose="020B0604020202020204" pitchFamily="34" charset="0"/>
-              </a:rPr>
-              <a:t>We tested with a smaller set of data (see 2017 Data Only model) to see the effect on the model’s performance.</a:t>
-            </a:r>
-          </a:p>
-        </p:txBody>
-      </p:sp>
-      <p:sp>
-        <p:nvSpPr>
-          <p:cNvPr id="30" name="Title 1">
-            <a:extLst>
-              <a:ext uri="{FF2B5EF4-FFF2-40B4-BE49-F238E27FC236}">
-                <a16:creationId xmlns:a16="http://schemas.microsoft.com/office/drawing/2014/main" id="{5F9659AD-4E67-419D-A158-EA131C7DE220}"/>
-              </a:ext>
-            </a:extLst>
-          </p:cNvPr>
-          <p:cNvSpPr txBox="1">
-            <a:spLocks/>
-          </p:cNvSpPr>
+            <a:endParaRPr lang="en-US" sz="1800" dirty="0">
+              <a:solidFill>
+                <a:schemeClr val="bg2">
+                  <a:lumMod val="10000"/>
+                </a:schemeClr>
+              </a:solidFill>
+              <a:latin typeface="Arial" panose="020B0604020202020204" pitchFamily="34" charset="0"/>
+              <a:cs typeface="Arial" panose="020B0604020202020204" pitchFamily="34" charset="0"/>
+            </a:endParaRPr>
+          </a:p>
+        </p:txBody>
+      </p:sp>
+      <p:pic>
+        <p:nvPicPr>
+          <p:cNvPr id="7" name="Picture 6">
+            <a:extLst>
+              <a:ext uri="{FF2B5EF4-FFF2-40B4-BE49-F238E27FC236}">
+                <a16:creationId xmlns:a16="http://schemas.microsoft.com/office/drawing/2014/main" id="{3E60D0D2-FDB2-4163-BC30-9B9362C2CD19}"/>
+              </a:ext>
+            </a:extLst>
+          </p:cNvPr>
+          <p:cNvPicPr>
+            <a:picLocks noChangeAspect="1"/>
+          </p:cNvPicPr>
           <p:nvPr/>
-        </p:nvSpPr>
+        </p:nvPicPr>
+        <p:blipFill rotWithShape="1">
+          <a:blip r:embed="rId3"/>
+          <a:srcRect t="4079" r="1814"/>
+          <a:stretch/>
+        </p:blipFill>
         <p:spPr>
           <a:xfrm>
-            <a:off x="6753138" y="6520888"/>
-            <a:ext cx="4853589" cy="336693"/>
+            <a:off x="7894498" y="750634"/>
+            <a:ext cx="4107624" cy="1792530"/>
           </a:xfrm>
           <a:prstGeom prst="rect">
             <a:avLst/>
           </a:prstGeom>
         </p:spPr>
+      </p:pic>
+      <p:pic>
+        <p:nvPicPr>
+          <p:cNvPr id="11" name="Picture 10">
+            <a:extLst>
+              <a:ext uri="{FF2B5EF4-FFF2-40B4-BE49-F238E27FC236}">
+                <a16:creationId xmlns:a16="http://schemas.microsoft.com/office/drawing/2014/main" id="{F43ED723-CE35-4CD0-A309-3B98896D78C8}"/>
+              </a:ext>
+            </a:extLst>
+          </p:cNvPr>
+          <p:cNvPicPr>
+            <a:picLocks noChangeAspect="1"/>
+          </p:cNvPicPr>
+          <p:nvPr/>
+        </p:nvPicPr>
+        <p:blipFill rotWithShape="1">
+          <a:blip r:embed="rId4"/>
+          <a:srcRect l="-1" t="3309" r="1814"/>
+          <a:stretch/>
+        </p:blipFill>
+        <p:spPr>
+          <a:xfrm>
+            <a:off x="3736549" y="771524"/>
+            <a:ext cx="4059752" cy="1771639"/>
+          </a:xfrm>
+          <a:prstGeom prst="rect">
+            <a:avLst/>
+          </a:prstGeom>
+        </p:spPr>
+      </p:pic>
+      <p:sp>
+        <p:nvSpPr>
+          <p:cNvPr id="32" name="Title 1">
+            <a:extLst>
+              <a:ext uri="{FF2B5EF4-FFF2-40B4-BE49-F238E27FC236}">
+                <a16:creationId xmlns:a16="http://schemas.microsoft.com/office/drawing/2014/main" id="{366B7C2E-6D19-4C5C-83DA-BA2268B7B2C8}"/>
+              </a:ext>
+            </a:extLst>
+          </p:cNvPr>
+          <p:cNvSpPr txBox="1">
+            <a:spLocks/>
+          </p:cNvSpPr>
+          <p:nvPr/>
+        </p:nvSpPr>
+        <p:spPr>
+          <a:xfrm>
+            <a:off x="840441" y="6531780"/>
+            <a:ext cx="3230521" cy="254912"/>
+          </a:xfrm>
+          <a:prstGeom prst="rect">
+            <a:avLst/>
+          </a:prstGeom>
+        </p:spPr>
         <p:txBody>
           <a:bodyPr vert="horz" lIns="91440" tIns="45720" rIns="91440" bIns="45720" rtlCol="0" anchor="b">
-            <a:normAutofit fontScale="47500" lnSpcReduction="20000"/>
+            <a:normAutofit fontScale="32500" lnSpcReduction="20000"/>
           </a:bodyPr>
           <a:lstStyle>
             <a:lvl1pPr algn="ctr" defTabSz="914400" rtl="0" eaLnBrk="1" latinLnBrk="0" hangingPunct="1">
@@ -6171,14 +6256,413 @@
             </a:lvl1pPr>
           </a:lstStyle>
           <a:p>
-            <a:pPr algn="r"/>
+            <a:pPr algn="l"/>
+            <a:r>
+              <a:rPr lang="en-US" sz="4000" dirty="0">
+                <a:solidFill>
+                  <a:schemeClr val="tx2"/>
+                </a:solidFill>
+              </a:rPr>
+              <a:t>USU CS 4320: Machine Learning, Fall 2022</a:t>
+            </a:r>
+          </a:p>
+        </p:txBody>
+      </p:sp>
+      <p:sp>
+        <p:nvSpPr>
+          <p:cNvPr id="33" name="Title 1">
+            <a:extLst>
+              <a:ext uri="{FF2B5EF4-FFF2-40B4-BE49-F238E27FC236}">
+                <a16:creationId xmlns:a16="http://schemas.microsoft.com/office/drawing/2014/main" id="{87F835D3-D3BF-4FD7-ACE8-AA11C8C2EE9E}"/>
+              </a:ext>
+            </a:extLst>
+          </p:cNvPr>
+          <p:cNvSpPr txBox="1">
+            <a:spLocks/>
+          </p:cNvSpPr>
+          <p:nvPr/>
+        </p:nvSpPr>
+        <p:spPr>
+          <a:xfrm>
+            <a:off x="3982675" y="6476303"/>
+            <a:ext cx="4481817" cy="442084"/>
+          </a:xfrm>
+          <a:prstGeom prst="rect">
+            <a:avLst/>
+          </a:prstGeom>
+        </p:spPr>
+        <p:txBody>
+          <a:bodyPr vert="horz" lIns="91440" tIns="45720" rIns="91440" bIns="45720" rtlCol="0" anchor="b">
+            <a:normAutofit fontScale="70000" lnSpcReduction="20000"/>
+          </a:bodyPr>
+          <a:lstStyle>
+            <a:lvl1pPr algn="ctr" defTabSz="914400" rtl="0" eaLnBrk="1" latinLnBrk="0" hangingPunct="1">
+              <a:lnSpc>
+                <a:spcPct val="90000"/>
+              </a:lnSpc>
+              <a:spcBef>
+                <a:spcPct val="0"/>
+              </a:spcBef>
+              <a:buNone/>
+              <a:defRPr sz="6000" kern="1200">
+                <a:solidFill>
+                  <a:schemeClr val="tx1"/>
+                </a:solidFill>
+                <a:latin typeface="+mj-lt"/>
+                <a:ea typeface="+mj-ea"/>
+                <a:cs typeface="+mj-cs"/>
+              </a:defRPr>
+            </a:lvl1pPr>
+          </a:lstStyle>
+          <a:p>
             <a:r>
               <a:rPr lang="en-US" sz="4000" b="1" dirty="0">
                 <a:solidFill>
                   <a:schemeClr val="tx2"/>
                 </a:solidFill>
               </a:rPr>
-              <a:t>Corbin Park, Charisse Spencer</a:t>
+              <a:t>Store Sales in Ecuador</a:t>
+            </a:r>
+          </a:p>
+        </p:txBody>
+      </p:sp>
+      <p:cxnSp>
+        <p:nvCxnSpPr>
+          <p:cNvPr id="38" name="Straight Connector 37">
+            <a:extLst>
+              <a:ext uri="{FF2B5EF4-FFF2-40B4-BE49-F238E27FC236}">
+                <a16:creationId xmlns:a16="http://schemas.microsoft.com/office/drawing/2014/main" id="{6B2BF58A-E16F-4A83-8041-E675668988C9}"/>
+              </a:ext>
+            </a:extLst>
+          </p:cNvPr>
+          <p:cNvCxnSpPr>
+            <a:cxnSpLocks/>
+          </p:cNvCxnSpPr>
+          <p:nvPr/>
+        </p:nvCxnSpPr>
+        <p:spPr>
+          <a:xfrm flipV="1">
+            <a:off x="914400" y="6476303"/>
+            <a:ext cx="10628851" cy="16776"/>
+          </a:xfrm>
+          <a:prstGeom prst="line">
+            <a:avLst/>
+          </a:prstGeom>
+          <a:ln w="19050">
+            <a:solidFill>
+              <a:schemeClr val="accent5">
+                <a:lumMod val="50000"/>
+              </a:schemeClr>
+            </a:solidFill>
+          </a:ln>
+        </p:spPr>
+        <p:style>
+          <a:lnRef idx="1">
+            <a:schemeClr val="accent1"/>
+          </a:lnRef>
+          <a:fillRef idx="0">
+            <a:schemeClr val="accent1"/>
+          </a:fillRef>
+          <a:effectRef idx="0">
+            <a:schemeClr val="accent1"/>
+          </a:effectRef>
+          <a:fontRef idx="minor">
+            <a:schemeClr val="tx1"/>
+          </a:fontRef>
+        </p:style>
+      </p:cxnSp>
+      <p:sp>
+        <p:nvSpPr>
+          <p:cNvPr id="40" name="Subtitle 2">
+            <a:extLst>
+              <a:ext uri="{FF2B5EF4-FFF2-40B4-BE49-F238E27FC236}">
+                <a16:creationId xmlns:a16="http://schemas.microsoft.com/office/drawing/2014/main" id="{FAF5D3B9-6468-4C7A-B203-EF84BFC7C8DE}"/>
+              </a:ext>
+            </a:extLst>
+          </p:cNvPr>
+          <p:cNvSpPr txBox="1">
+            <a:spLocks/>
+          </p:cNvSpPr>
+          <p:nvPr/>
+        </p:nvSpPr>
+        <p:spPr>
+          <a:xfrm>
+            <a:off x="6492725" y="2710351"/>
+            <a:ext cx="2756177" cy="2441086"/>
+          </a:xfrm>
+          <a:prstGeom prst="rect">
+            <a:avLst/>
+          </a:prstGeom>
+          <a:solidFill>
+            <a:schemeClr val="bg1">
+              <a:lumMod val="75000"/>
+            </a:schemeClr>
+          </a:solidFill>
+        </p:spPr>
+        <p:txBody>
+          <a:bodyPr vert="horz" lIns="91440" tIns="45720" rIns="91440" bIns="45720" rtlCol="0" anchor="t">
+            <a:normAutofit/>
+          </a:bodyPr>
+          <a:lstStyle>
+            <a:lvl1pPr marL="0" indent="0" algn="ctr" defTabSz="914400" rtl="0" eaLnBrk="1" latinLnBrk="0" hangingPunct="1">
+              <a:lnSpc>
+                <a:spcPct val="90000"/>
+              </a:lnSpc>
+              <a:spcBef>
+                <a:spcPts val="1000"/>
+              </a:spcBef>
+              <a:buFont typeface="Arial" panose="020B0604020202020204" pitchFamily="34" charset="0"/>
+              <a:buNone/>
+              <a:defRPr sz="2400" kern="1200">
+                <a:solidFill>
+                  <a:schemeClr val="tx1"/>
+                </a:solidFill>
+                <a:latin typeface="+mn-lt"/>
+                <a:ea typeface="+mn-ea"/>
+                <a:cs typeface="+mn-cs"/>
+              </a:defRPr>
+            </a:lvl1pPr>
+            <a:lvl2pPr marL="457200" indent="0" algn="ctr" defTabSz="914400" rtl="0" eaLnBrk="1" latinLnBrk="0" hangingPunct="1">
+              <a:lnSpc>
+                <a:spcPct val="90000"/>
+              </a:lnSpc>
+              <a:spcBef>
+                <a:spcPts val="500"/>
+              </a:spcBef>
+              <a:buFont typeface="Arial" panose="020B0604020202020204" pitchFamily="34" charset="0"/>
+              <a:buNone/>
+              <a:defRPr sz="2000" kern="1200">
+                <a:solidFill>
+                  <a:schemeClr val="tx1"/>
+                </a:solidFill>
+                <a:latin typeface="+mn-lt"/>
+                <a:ea typeface="+mn-ea"/>
+                <a:cs typeface="+mn-cs"/>
+              </a:defRPr>
+            </a:lvl2pPr>
+            <a:lvl3pPr marL="914400" indent="0" algn="ctr" defTabSz="914400" rtl="0" eaLnBrk="1" latinLnBrk="0" hangingPunct="1">
+              <a:lnSpc>
+                <a:spcPct val="90000"/>
+              </a:lnSpc>
+              <a:spcBef>
+                <a:spcPts val="500"/>
+              </a:spcBef>
+              <a:buFont typeface="Arial" panose="020B0604020202020204" pitchFamily="34" charset="0"/>
+              <a:buNone/>
+              <a:defRPr sz="1800" kern="1200">
+                <a:solidFill>
+                  <a:schemeClr val="tx1"/>
+                </a:solidFill>
+                <a:latin typeface="+mn-lt"/>
+                <a:ea typeface="+mn-ea"/>
+                <a:cs typeface="+mn-cs"/>
+              </a:defRPr>
+            </a:lvl3pPr>
+            <a:lvl4pPr marL="1371600" indent="0" algn="ctr" defTabSz="914400" rtl="0" eaLnBrk="1" latinLnBrk="0" hangingPunct="1">
+              <a:lnSpc>
+                <a:spcPct val="90000"/>
+              </a:lnSpc>
+              <a:spcBef>
+                <a:spcPts val="500"/>
+              </a:spcBef>
+              <a:buFont typeface="Arial" panose="020B0604020202020204" pitchFamily="34" charset="0"/>
+              <a:buNone/>
+              <a:defRPr sz="1600" kern="1200">
+                <a:solidFill>
+                  <a:schemeClr val="tx1"/>
+                </a:solidFill>
+                <a:latin typeface="+mn-lt"/>
+                <a:ea typeface="+mn-ea"/>
+                <a:cs typeface="+mn-cs"/>
+              </a:defRPr>
+            </a:lvl4pPr>
+            <a:lvl5pPr marL="1828800" indent="0" algn="ctr" defTabSz="914400" rtl="0" eaLnBrk="1" latinLnBrk="0" hangingPunct="1">
+              <a:lnSpc>
+                <a:spcPct val="90000"/>
+              </a:lnSpc>
+              <a:spcBef>
+                <a:spcPts val="500"/>
+              </a:spcBef>
+              <a:buFont typeface="Arial" panose="020B0604020202020204" pitchFamily="34" charset="0"/>
+              <a:buNone/>
+              <a:defRPr sz="1600" kern="1200">
+                <a:solidFill>
+                  <a:schemeClr val="tx1"/>
+                </a:solidFill>
+                <a:latin typeface="+mn-lt"/>
+                <a:ea typeface="+mn-ea"/>
+                <a:cs typeface="+mn-cs"/>
+              </a:defRPr>
+            </a:lvl5pPr>
+            <a:lvl6pPr marL="2286000" indent="0" algn="ctr" defTabSz="914400" rtl="0" eaLnBrk="1" latinLnBrk="0" hangingPunct="1">
+              <a:lnSpc>
+                <a:spcPct val="90000"/>
+              </a:lnSpc>
+              <a:spcBef>
+                <a:spcPts val="500"/>
+              </a:spcBef>
+              <a:buFont typeface="Arial" panose="020B0604020202020204" pitchFamily="34" charset="0"/>
+              <a:buNone/>
+              <a:defRPr sz="1600" kern="1200">
+                <a:solidFill>
+                  <a:schemeClr val="tx1"/>
+                </a:solidFill>
+                <a:latin typeface="+mn-lt"/>
+                <a:ea typeface="+mn-ea"/>
+                <a:cs typeface="+mn-cs"/>
+              </a:defRPr>
+            </a:lvl6pPr>
+            <a:lvl7pPr marL="2743200" indent="0" algn="ctr" defTabSz="914400" rtl="0" eaLnBrk="1" latinLnBrk="0" hangingPunct="1">
+              <a:lnSpc>
+                <a:spcPct val="90000"/>
+              </a:lnSpc>
+              <a:spcBef>
+                <a:spcPts val="500"/>
+              </a:spcBef>
+              <a:buFont typeface="Arial" panose="020B0604020202020204" pitchFamily="34" charset="0"/>
+              <a:buNone/>
+              <a:defRPr sz="1600" kern="1200">
+                <a:solidFill>
+                  <a:schemeClr val="tx1"/>
+                </a:solidFill>
+                <a:latin typeface="+mn-lt"/>
+                <a:ea typeface="+mn-ea"/>
+                <a:cs typeface="+mn-cs"/>
+              </a:defRPr>
+            </a:lvl7pPr>
+            <a:lvl8pPr marL="3200400" indent="0" algn="ctr" defTabSz="914400" rtl="0" eaLnBrk="1" latinLnBrk="0" hangingPunct="1">
+              <a:lnSpc>
+                <a:spcPct val="90000"/>
+              </a:lnSpc>
+              <a:spcBef>
+                <a:spcPts val="500"/>
+              </a:spcBef>
+              <a:buFont typeface="Arial" panose="020B0604020202020204" pitchFamily="34" charset="0"/>
+              <a:buNone/>
+              <a:defRPr sz="1600" kern="1200">
+                <a:solidFill>
+                  <a:schemeClr val="tx1"/>
+                </a:solidFill>
+                <a:latin typeface="+mn-lt"/>
+                <a:ea typeface="+mn-ea"/>
+                <a:cs typeface="+mn-cs"/>
+              </a:defRPr>
+            </a:lvl8pPr>
+            <a:lvl9pPr marL="3657600" indent="0" algn="ctr" defTabSz="914400" rtl="0" eaLnBrk="1" latinLnBrk="0" hangingPunct="1">
+              <a:lnSpc>
+                <a:spcPct val="90000"/>
+              </a:lnSpc>
+              <a:spcBef>
+                <a:spcPts val="500"/>
+              </a:spcBef>
+              <a:buFont typeface="Arial" panose="020B0604020202020204" pitchFamily="34" charset="0"/>
+              <a:buNone/>
+              <a:defRPr sz="1600" kern="1200">
+                <a:solidFill>
+                  <a:schemeClr val="tx1"/>
+                </a:solidFill>
+                <a:latin typeface="+mn-lt"/>
+                <a:ea typeface="+mn-ea"/>
+                <a:cs typeface="+mn-cs"/>
+              </a:defRPr>
+            </a:lvl9pPr>
+          </a:lstStyle>
+          <a:p>
+            <a:pPr algn="l"/>
+            <a:r>
+              <a:rPr lang="en-US" sz="1900" u="sng" dirty="0">
+                <a:solidFill>
+                  <a:schemeClr val="bg2">
+                    <a:lumMod val="10000"/>
+                  </a:schemeClr>
+                </a:solidFill>
+                <a:latin typeface="Arial" panose="020B0604020202020204" pitchFamily="34" charset="0"/>
+                <a:cs typeface="Arial" panose="020B0604020202020204" pitchFamily="34" charset="0"/>
+              </a:rPr>
+              <a:t>Another Topic</a:t>
+            </a:r>
+            <a:r>
+              <a:rPr lang="en-US" sz="2700" dirty="0">
+                <a:solidFill>
+                  <a:schemeClr val="bg2">
+                    <a:lumMod val="10000"/>
+                  </a:schemeClr>
+                </a:solidFill>
+                <a:latin typeface="Arial" panose="020B0604020202020204" pitchFamily="34" charset="0"/>
+                <a:cs typeface="Arial" panose="020B0604020202020204" pitchFamily="34" charset="0"/>
+              </a:rPr>
+              <a:t>:</a:t>
+            </a:r>
+          </a:p>
+        </p:txBody>
+      </p:sp>
+      <p:sp>
+        <p:nvSpPr>
+          <p:cNvPr id="41" name="TextBox 40">
+            <a:extLst>
+              <a:ext uri="{FF2B5EF4-FFF2-40B4-BE49-F238E27FC236}">
+                <a16:creationId xmlns:a16="http://schemas.microsoft.com/office/drawing/2014/main" id="{02C11D7D-769D-49C4-8936-5CC5C45C128A}"/>
+              </a:ext>
+            </a:extLst>
+          </p:cNvPr>
+          <p:cNvSpPr txBox="1"/>
+          <p:nvPr/>
+        </p:nvSpPr>
+        <p:spPr>
+          <a:xfrm>
+            <a:off x="4723437" y="498700"/>
+            <a:ext cx="2085975" cy="261610"/>
+          </a:xfrm>
+          <a:prstGeom prst="rect">
+            <a:avLst/>
+          </a:prstGeom>
+          <a:noFill/>
+        </p:spPr>
+        <p:txBody>
+          <a:bodyPr wrap="square" rtlCol="0">
+            <a:spAutoFit/>
+          </a:bodyPr>
+          <a:lstStyle/>
+          <a:p>
+            <a:r>
+              <a:rPr lang="en-US" sz="1100" dirty="0"/>
+              <a:t>Transactions by Day of the Week</a:t>
+            </a:r>
+          </a:p>
+        </p:txBody>
+      </p:sp>
+      <p:sp>
+        <p:nvSpPr>
+          <p:cNvPr id="42" name="TextBox 41">
+            <a:extLst>
+              <a:ext uri="{FF2B5EF4-FFF2-40B4-BE49-F238E27FC236}">
+                <a16:creationId xmlns:a16="http://schemas.microsoft.com/office/drawing/2014/main" id="{AF29D555-3560-4C80-8A63-447D394AD06E}"/>
+              </a:ext>
+            </a:extLst>
+          </p:cNvPr>
+          <p:cNvSpPr txBox="1"/>
+          <p:nvPr/>
+        </p:nvSpPr>
+        <p:spPr>
+          <a:xfrm>
+            <a:off x="9010678" y="459580"/>
+            <a:ext cx="2054881" cy="261610"/>
+          </a:xfrm>
+          <a:prstGeom prst="rect">
+            <a:avLst/>
+          </a:prstGeom>
+          <a:noFill/>
+        </p:spPr>
+        <p:txBody>
+          <a:bodyPr wrap="square" rtlCol="0">
+            <a:spAutoFit/>
+          </a:bodyPr>
+          <a:lstStyle/>
+          <a:p>
+            <a:pPr algn="ctr"/>
+            <a:r>
+              <a:rPr lang="en-US" sz="1100" dirty="0"/>
+              <a:t>Sales over the Years</a:t>
             </a:r>
           </a:p>
         </p:txBody>

</xml_diff>

<commit_message>
Added preprocessing section, small edits
</commit_message>
<xml_diff>
--- a/Presentation Slide.pptx
+++ b/Presentation Slide.pptx
@@ -3584,7 +3584,7 @@
                 <a:latin typeface="Arial" panose="020B0604020202020204" pitchFamily="34" charset="0"/>
                 <a:cs typeface="Arial" panose="020B0604020202020204" pitchFamily="34" charset="0"/>
               </a:rPr>
-              <a:t>Data Fields:</a:t>
+              <a:t>Main Data Fields:</a:t>
             </a:r>
           </a:p>
           <a:p>
@@ -3709,7 +3709,7 @@
                 <a:latin typeface="Arial" panose="020B0604020202020204" pitchFamily="34" charset="0"/>
                 <a:cs typeface="Arial" panose="020B0604020202020204" pitchFamily="34" charset="0"/>
               </a:rPr>
-              <a:t>– </a:t>
+              <a:t>– Special processing</a:t>
             </a:r>
             <a:br>
               <a:rPr lang="en-US" sz="1400" i="1" dirty="0">
@@ -4869,7 +4869,7 @@
                     <a:latin typeface="Arial" panose="020B0604020202020204" pitchFamily="34" charset="0"/>
                     <a:cs typeface="Arial" panose="020B0604020202020204" pitchFamily="34" charset="0"/>
                   </a:rPr>
-                  <a:t> + Lin Reg: 	0.91495</a:t>
+                  <a:t> + Linear Reg.: 	0.91495</a:t>
                 </a:r>
               </a:p>
               <a:p>
@@ -5170,7 +5170,7 @@
                 <a:latin typeface="Arial" panose="020B0604020202020204" pitchFamily="34" charset="0"/>
                 <a:cs typeface="Arial" panose="020B0604020202020204" pitchFamily="34" charset="0"/>
               </a:rPr>
-              <a:t>Other Included Data</a:t>
+              <a:t>Other Included Datasets</a:t>
             </a:r>
             <a:r>
               <a:rPr lang="en-US" sz="1800" dirty="0">
@@ -5361,7 +5361,7 @@
                 <a:latin typeface="Arial" panose="020B0604020202020204" pitchFamily="34" charset="0"/>
                 <a:cs typeface="Arial" panose="020B0604020202020204" pitchFamily="34" charset="0"/>
               </a:rPr>
-              <a:t>Location, size, and other logistical information about each store</a:t>
+              <a:t>Location, size, dates of operation, and other logistical information about each store</a:t>
             </a:r>
             <a:endParaRPr lang="en-US" sz="1300" b="1" dirty="0">
               <a:solidFill>
@@ -5405,7 +5405,7 @@
         </p:spPr>
         <p:txBody>
           <a:bodyPr vert="horz" lIns="91440" tIns="45720" rIns="91440" bIns="45720" rtlCol="0" anchor="t">
-            <a:normAutofit/>
+            <a:normAutofit fontScale="85000" lnSpcReduction="20000"/>
           </a:bodyPr>
           <a:lstStyle>
             <a:lvl1pPr marL="0" indent="0" algn="ctr" defTabSz="914400" rtl="0" eaLnBrk="1" latinLnBrk="0" hangingPunct="1">
@@ -5574,7 +5574,7 @@
           <a:p>
             <a:pPr algn="l"/>
             <a:r>
-              <a:rPr lang="en-US" sz="1900" u="sng" dirty="0">
+              <a:rPr lang="en-US" sz="1800" u="sng" dirty="0">
                 <a:solidFill>
                   <a:schemeClr val="bg2">
                     <a:lumMod val="10000"/>
@@ -5583,7 +5583,7 @@
                 <a:latin typeface="Arial" panose="020B0604020202020204" pitchFamily="34" charset="0"/>
                 <a:cs typeface="Arial" panose="020B0604020202020204" pitchFamily="34" charset="0"/>
               </a:rPr>
-              <a:t>Another Topic</a:t>
+              <a:t>Preprocessing</a:t>
             </a:r>
             <a:r>
               <a:rPr lang="en-US" sz="2700" dirty="0">
@@ -5596,6 +5596,84 @@
                 <a:cs typeface="Arial" panose="020B0604020202020204" pitchFamily="34" charset="0"/>
               </a:rPr>
               <a:t>:</a:t>
+            </a:r>
+          </a:p>
+          <a:p>
+            <a:pPr algn="l"/>
+            <a:r>
+              <a:rPr lang="en-US" sz="1600" dirty="0">
+                <a:solidFill>
+                  <a:schemeClr val="bg2">
+                    <a:lumMod val="10000"/>
+                  </a:schemeClr>
+                </a:solidFill>
+                <a:latin typeface="Arial" panose="020B0604020202020204" pitchFamily="34" charset="0"/>
+                <a:cs typeface="Arial" panose="020B0604020202020204" pitchFamily="34" charset="0"/>
+              </a:rPr>
+              <a:t>Calendar functions (see </a:t>
+            </a:r>
+            <a:r>
+              <a:rPr lang="en-US" sz="1600" dirty="0" err="1">
+                <a:solidFill>
+                  <a:schemeClr val="bg2">
+                    <a:lumMod val="10000"/>
+                  </a:schemeClr>
+                </a:solidFill>
+                <a:latin typeface="Arial" panose="020B0604020202020204" pitchFamily="34" charset="0"/>
+                <a:cs typeface="Arial" panose="020B0604020202020204" pitchFamily="34" charset="0"/>
+              </a:rPr>
+              <a:t>CalendarFourier</a:t>
+            </a:r>
+            <a:r>
+              <a:rPr lang="en-US" sz="1600" dirty="0">
+                <a:solidFill>
+                  <a:schemeClr val="bg2">
+                    <a:lumMod val="10000"/>
+                  </a:schemeClr>
+                </a:solidFill>
+                <a:latin typeface="Arial" panose="020B0604020202020204" pitchFamily="34" charset="0"/>
+                <a:cs typeface="Arial" panose="020B0604020202020204" pitchFamily="34" charset="0"/>
+              </a:rPr>
+              <a:t>() and </a:t>
+            </a:r>
+            <a:r>
+              <a:rPr lang="en-US" sz="1600" dirty="0" err="1">
+                <a:solidFill>
+                  <a:schemeClr val="bg2">
+                    <a:lumMod val="10000"/>
+                  </a:schemeClr>
+                </a:solidFill>
+                <a:latin typeface="Arial" panose="020B0604020202020204" pitchFamily="34" charset="0"/>
+                <a:cs typeface="Arial" panose="020B0604020202020204" pitchFamily="34" charset="0"/>
+              </a:rPr>
+              <a:t>DeterministicProcess</a:t>
+            </a:r>
+            <a:r>
+              <a:rPr lang="en-US" sz="1600" dirty="0">
+                <a:solidFill>
+                  <a:schemeClr val="bg2">
+                    <a:lumMod val="10000"/>
+                  </a:schemeClr>
+                </a:solidFill>
+                <a:latin typeface="Arial" panose="020B0604020202020204" pitchFamily="34" charset="0"/>
+                <a:cs typeface="Arial" panose="020B0604020202020204" pitchFamily="34" charset="0"/>
+              </a:rPr>
+              <a:t>() for seasonal processing) were used to correlate holidays with dates in the training dataset. This became the trends dataset.</a:t>
+            </a:r>
+          </a:p>
+          <a:p>
+            <a:pPr algn="l"/>
+            <a:r>
+              <a:rPr lang="en-US" sz="1600" dirty="0">
+                <a:solidFill>
+                  <a:schemeClr val="bg2">
+                    <a:lumMod val="10000"/>
+                  </a:schemeClr>
+                </a:solidFill>
+                <a:latin typeface="Arial" panose="020B0604020202020204" pitchFamily="34" charset="0"/>
+                <a:cs typeface="Arial" panose="020B0604020202020204" pitchFamily="34" charset="0"/>
+              </a:rPr>
+              <a:t>The original (processed) dataset, in conjunction with the trends dataset, was used to train and test models.</a:t>
             </a:r>
           </a:p>
         </p:txBody>
@@ -5850,7 +5928,7 @@
                 <a:latin typeface="Arial" panose="020B0604020202020204" pitchFamily="34" charset="0"/>
                 <a:cs typeface="Arial" panose="020B0604020202020204" pitchFamily="34" charset="0"/>
               </a:rPr>
-              <a:t>We tested with a smaller set of data (see 2017 Data Only model) to see the effect on the model’s performance.</a:t>
+              <a:t>We tested with a smaller and more recent set of data (see 2017 Data Only model) to see the effect on the model’s performance.</a:t>
             </a:r>
           </a:p>
         </p:txBody>
@@ -6122,7 +6200,7 @@
                 <a:latin typeface="Arial" panose="020B0604020202020204" pitchFamily="34" charset="0"/>
                 <a:cs typeface="Arial" panose="020B0604020202020204" pitchFamily="34" charset="0"/>
               </a:rPr>
-              <a:t>Data Exploration &amp; Preprocessing</a:t>
+              <a:t>Data Exploration</a:t>
             </a:r>
             <a:r>
               <a:rPr lang="en-US" sz="1800" dirty="0">
@@ -6579,7 +6657,7 @@
                 <a:latin typeface="Arial" panose="020B0604020202020204" pitchFamily="34" charset="0"/>
                 <a:cs typeface="Arial" panose="020B0604020202020204" pitchFamily="34" charset="0"/>
               </a:rPr>
-              <a:t>Another Topic</a:t>
+              <a:t>Predictions</a:t>
             </a:r>
             <a:r>
               <a:rPr lang="en-US" sz="2700" dirty="0">
@@ -6593,6 +6671,18 @@
               </a:rPr>
               <a:t>:</a:t>
             </a:r>
+          </a:p>
+          <a:p>
+            <a:pPr algn="l"/>
+            <a:endParaRPr lang="en-US" sz="2700" dirty="0">
+              <a:solidFill>
+                <a:schemeClr val="bg2">
+                  <a:lumMod val="10000"/>
+                </a:schemeClr>
+              </a:solidFill>
+              <a:latin typeface="Arial" panose="020B0604020202020204" pitchFamily="34" charset="0"/>
+              <a:cs typeface="Arial" panose="020B0604020202020204" pitchFamily="34" charset="0"/>
+            </a:endParaRPr>
           </a:p>
         </p:txBody>
       </p:sp>
@@ -6624,9 +6714,10 @@
           </a:bodyPr>
           <a:lstStyle/>
           <a:p>
+            <a:pPr algn="ctr"/>
             <a:r>
               <a:rPr lang="en-US" sz="1100" dirty="0"/>
-              <a:t>Transactions by Day of the Week</a:t>
+              <a:t>Average Weekly Transacting</a:t>
             </a:r>
           </a:p>
         </p:txBody>

</xml_diff>

<commit_message>
Added Sales section, other minor poster edits
</commit_message>
<xml_diff>
--- a/Presentation Slide.pptx
+++ b/Presentation Slide.pptx
@@ -104,6 +104,11 @@
       </a:defRPr>
     </a:lvl9pPr>
   </p:defaultTextStyle>
+  <p:extLst>
+    <p:ext uri="{EFAFB233-063F-42B5-8137-9DF3F51BA10A}">
+      <p15:sldGuideLst xmlns:p15="http://schemas.microsoft.com/office/powerpoint/2012/main"/>
+    </p:ext>
+  </p:extLst>
 </p:presentation>
 </file>
 
@@ -254,7 +259,7 @@
           <a:p>
             <a:fld id="{6DCD55AD-CB5E-4725-8FB2-2EA21B687691}" type="datetimeFigureOut">
               <a:rPr lang="en-US" smtClean="0"/>
-              <a:t>29-Nov-22</a:t>
+              <a:t>30-Nov-22</a:t>
             </a:fld>
             <a:endParaRPr lang="en-US"/>
           </a:p>
@@ -452,7 +457,7 @@
           <a:p>
             <a:fld id="{6DCD55AD-CB5E-4725-8FB2-2EA21B687691}" type="datetimeFigureOut">
               <a:rPr lang="en-US" smtClean="0"/>
-              <a:t>29-Nov-22</a:t>
+              <a:t>30-Nov-22</a:t>
             </a:fld>
             <a:endParaRPr lang="en-US"/>
           </a:p>
@@ -660,7 +665,7 @@
           <a:p>
             <a:fld id="{6DCD55AD-CB5E-4725-8FB2-2EA21B687691}" type="datetimeFigureOut">
               <a:rPr lang="en-US" smtClean="0"/>
-              <a:t>29-Nov-22</a:t>
+              <a:t>30-Nov-22</a:t>
             </a:fld>
             <a:endParaRPr lang="en-US"/>
           </a:p>
@@ -858,7 +863,7 @@
           <a:p>
             <a:fld id="{6DCD55AD-CB5E-4725-8FB2-2EA21B687691}" type="datetimeFigureOut">
               <a:rPr lang="en-US" smtClean="0"/>
-              <a:t>29-Nov-22</a:t>
+              <a:t>30-Nov-22</a:t>
             </a:fld>
             <a:endParaRPr lang="en-US"/>
           </a:p>
@@ -1133,7 +1138,7 @@
           <a:p>
             <a:fld id="{6DCD55AD-CB5E-4725-8FB2-2EA21B687691}" type="datetimeFigureOut">
               <a:rPr lang="en-US" smtClean="0"/>
-              <a:t>29-Nov-22</a:t>
+              <a:t>30-Nov-22</a:t>
             </a:fld>
             <a:endParaRPr lang="en-US"/>
           </a:p>
@@ -1398,7 +1403,7 @@
           <a:p>
             <a:fld id="{6DCD55AD-CB5E-4725-8FB2-2EA21B687691}" type="datetimeFigureOut">
               <a:rPr lang="en-US" smtClean="0"/>
-              <a:t>29-Nov-22</a:t>
+              <a:t>30-Nov-22</a:t>
             </a:fld>
             <a:endParaRPr lang="en-US"/>
           </a:p>
@@ -1810,7 +1815,7 @@
           <a:p>
             <a:fld id="{6DCD55AD-CB5E-4725-8FB2-2EA21B687691}" type="datetimeFigureOut">
               <a:rPr lang="en-US" smtClean="0"/>
-              <a:t>29-Nov-22</a:t>
+              <a:t>30-Nov-22</a:t>
             </a:fld>
             <a:endParaRPr lang="en-US"/>
           </a:p>
@@ -1951,7 +1956,7 @@
           <a:p>
             <a:fld id="{6DCD55AD-CB5E-4725-8FB2-2EA21B687691}" type="datetimeFigureOut">
               <a:rPr lang="en-US" smtClean="0"/>
-              <a:t>29-Nov-22</a:t>
+              <a:t>30-Nov-22</a:t>
             </a:fld>
             <a:endParaRPr lang="en-US"/>
           </a:p>
@@ -2064,7 +2069,7 @@
           <a:p>
             <a:fld id="{6DCD55AD-CB5E-4725-8FB2-2EA21B687691}" type="datetimeFigureOut">
               <a:rPr lang="en-US" smtClean="0"/>
-              <a:t>29-Nov-22</a:t>
+              <a:t>30-Nov-22</a:t>
             </a:fld>
             <a:endParaRPr lang="en-US"/>
           </a:p>
@@ -2375,7 +2380,7 @@
           <a:p>
             <a:fld id="{6DCD55AD-CB5E-4725-8FB2-2EA21B687691}" type="datetimeFigureOut">
               <a:rPr lang="en-US" smtClean="0"/>
-              <a:t>29-Nov-22</a:t>
+              <a:t>30-Nov-22</a:t>
             </a:fld>
             <a:endParaRPr lang="en-US"/>
           </a:p>
@@ -2663,7 +2668,7 @@
           <a:p>
             <a:fld id="{6DCD55AD-CB5E-4725-8FB2-2EA21B687691}" type="datetimeFigureOut">
               <a:rPr lang="en-US" smtClean="0"/>
-              <a:t>29-Nov-22</a:t>
+              <a:t>30-Nov-22</a:t>
             </a:fld>
             <a:endParaRPr lang="en-US"/>
           </a:p>
@@ -2904,7 +2909,7 @@
           <a:p>
             <a:fld id="{6DCD55AD-CB5E-4725-8FB2-2EA21B687691}" type="datetimeFigureOut">
               <a:rPr lang="en-US" smtClean="0"/>
-              <a:t>29-Nov-22</a:t>
+              <a:t>30-Nov-22</a:t>
             </a:fld>
             <a:endParaRPr lang="en-US"/>
           </a:p>
@@ -3806,7 +3811,7 @@
                 <a:latin typeface="Arial" panose="020B0604020202020204" pitchFamily="34" charset="0"/>
                 <a:cs typeface="Arial" panose="020B0604020202020204" pitchFamily="34" charset="0"/>
               </a:rPr>
-              <a:t>Identifier for the store sold at</a:t>
+              <a:t>Identifier for the store items were sold at</a:t>
             </a:r>
           </a:p>
           <a:p>
@@ -4042,8 +4047,8 @@
           </a:p>
         </p:txBody>
       </p:sp>
-      <mc:AlternateContent xmlns:mc="http://schemas.openxmlformats.org/markup-compatibility/2006">
-        <mc:Choice xmlns:a14="http://schemas.microsoft.com/office/drawing/2010/main" Requires="a14">
+      <mc:AlternateContent xmlns:mc="http://schemas.openxmlformats.org/markup-compatibility/2006" xmlns:a14="http://schemas.microsoft.com/office/drawing/2010/main">
+        <mc:Choice Requires="a14">
           <p:sp>
             <p:nvSpPr>
               <p:cNvPr id="25" name="Subtitle 2">
@@ -4917,7 +4922,7 @@
             </p:txBody>
           </p:sp>
         </mc:Choice>
-        <mc:Fallback>
+        <mc:Fallback xmlns="">
           <p:sp>
             <p:nvSpPr>
               <p:cNvPr id="25" name="Subtitle 2">
@@ -5440,7 +5445,7 @@
         <p:spPr>
           <a:xfrm>
             <a:off x="3638351" y="2710351"/>
-            <a:ext cx="2756177" cy="2441086"/>
+            <a:ext cx="2756177" cy="2620370"/>
           </a:xfrm>
           <a:prstGeom prst="rect">
             <a:avLst/>
@@ -5453,7 +5458,7 @@
         </p:spPr>
         <p:txBody>
           <a:bodyPr vert="horz" lIns="91440" tIns="45720" rIns="91440" bIns="45720" rtlCol="0" anchor="t">
-            <a:normAutofit fontScale="40000" lnSpcReduction="20000"/>
+            <a:normAutofit fontScale="25000" lnSpcReduction="20000"/>
           </a:bodyPr>
           <a:lstStyle>
             <a:lvl1pPr marL="0" indent="0" algn="ctr" defTabSz="914400" rtl="0" eaLnBrk="1" latinLnBrk="0" hangingPunct="1">
@@ -5622,7 +5627,7 @@
           <a:p>
             <a:pPr algn="l"/>
             <a:r>
-              <a:rPr lang="en-US" sz="4800" u="sng" dirty="0">
+              <a:rPr lang="en-US" sz="7600" u="sng" dirty="0">
                 <a:solidFill>
                   <a:schemeClr val="bg2">
                     <a:lumMod val="10000"/>
@@ -5634,7 +5639,7 @@
               <a:t>Preprocessing</a:t>
             </a:r>
             <a:r>
-              <a:rPr lang="en-US" sz="4800" dirty="0">
+              <a:rPr lang="en-US" sz="7600" dirty="0">
                 <a:solidFill>
                   <a:schemeClr val="bg2">
                     <a:lumMod val="10000"/>
@@ -5649,7 +5654,7 @@
           <a:p>
             <a:pPr algn="l"/>
             <a:r>
-              <a:rPr lang="en-US" sz="3100" dirty="0">
+              <a:rPr lang="en-US" sz="5200" dirty="0">
                 <a:solidFill>
                   <a:schemeClr val="bg2">
                     <a:lumMod val="10000"/>
@@ -5661,7 +5666,7 @@
               <a:t>*Calendar functions (see </a:t>
             </a:r>
             <a:r>
-              <a:rPr lang="en-US" sz="3100" dirty="0" err="1">
+              <a:rPr lang="en-US" sz="5200" dirty="0" err="1">
                 <a:solidFill>
                   <a:schemeClr val="bg2">
                     <a:lumMod val="10000"/>
@@ -5673,7 +5678,7 @@
               <a:t>CalendarFourier</a:t>
             </a:r>
             <a:r>
-              <a:rPr lang="en-US" sz="3100" dirty="0">
+              <a:rPr lang="en-US" sz="5200" dirty="0">
                 <a:solidFill>
                   <a:schemeClr val="bg2">
                     <a:lumMod val="10000"/>
@@ -5685,7 +5690,7 @@
               <a:t>() and </a:t>
             </a:r>
             <a:r>
-              <a:rPr lang="en-US" sz="3100" dirty="0" err="1">
+              <a:rPr lang="en-US" sz="5200" dirty="0" err="1">
                 <a:solidFill>
                   <a:schemeClr val="bg2">
                     <a:lumMod val="10000"/>
@@ -5697,7 +5702,7 @@
               <a:t>DeterministicProcess</a:t>
             </a:r>
             <a:r>
-              <a:rPr lang="en-US" sz="3100" dirty="0">
+              <a:rPr lang="en-US" sz="5200" dirty="0">
                 <a:solidFill>
                   <a:schemeClr val="bg2">
                     <a:lumMod val="10000"/>
@@ -5709,7 +5714,7 @@
               <a:t>() from </a:t>
             </a:r>
             <a:r>
-              <a:rPr lang="en-US" sz="3100" dirty="0" err="1">
+              <a:rPr lang="en-US" sz="5200" dirty="0" err="1">
                 <a:solidFill>
                   <a:schemeClr val="bg2">
                     <a:lumMod val="10000"/>
@@ -5721,7 +5726,7 @@
               <a:t>statsmodels</a:t>
             </a:r>
             <a:r>
-              <a:rPr lang="en-US" sz="3100" dirty="0">
+              <a:rPr lang="en-US" sz="5200" dirty="0">
                 <a:solidFill>
                   <a:schemeClr val="bg2">
                     <a:lumMod val="10000"/>
@@ -5736,7 +5741,7 @@
           <a:p>
             <a:pPr algn="l"/>
             <a:r>
-              <a:rPr lang="en-US" sz="3100" dirty="0">
+              <a:rPr lang="en-US" sz="5200" dirty="0">
                 <a:solidFill>
                   <a:schemeClr val="bg2">
                     <a:lumMod val="10000"/>
@@ -5778,8 +5783,8 @@
         </p:nvSpPr>
         <p:spPr>
           <a:xfrm>
-            <a:off x="3638351" y="5259898"/>
-            <a:ext cx="5601074" cy="1140878"/>
+            <a:off x="3638351" y="5422406"/>
+            <a:ext cx="5601074" cy="978370"/>
           </a:xfrm>
           <a:prstGeom prst="rect">
             <a:avLst/>
@@ -5792,7 +5797,7 @@
         </p:spPr>
         <p:txBody>
           <a:bodyPr vert="horz" lIns="91440" tIns="45720" rIns="91440" bIns="45720" rtlCol="0" anchor="t">
-            <a:normAutofit fontScale="70000" lnSpcReduction="20000"/>
+            <a:normAutofit fontScale="55000" lnSpcReduction="20000"/>
           </a:bodyPr>
           <a:lstStyle>
             <a:lvl1pPr marL="0" indent="0" algn="ctr" defTabSz="914400" rtl="0" eaLnBrk="1" latinLnBrk="0" hangingPunct="1">
@@ -5961,7 +5966,7 @@
           <a:p>
             <a:pPr algn="l"/>
             <a:r>
-              <a:rPr lang="en-US" sz="2700" u="sng" dirty="0">
+              <a:rPr lang="en-US" sz="3500" u="sng" dirty="0">
                 <a:solidFill>
                   <a:schemeClr val="bg2">
                     <a:lumMod val="10000"/>
@@ -5973,7 +5978,7 @@
               <a:t>Anomalous Data</a:t>
             </a:r>
             <a:r>
-              <a:rPr lang="en-US" sz="2700" dirty="0">
+              <a:rPr lang="en-US" sz="3500" dirty="0">
                 <a:solidFill>
                   <a:schemeClr val="bg2">
                     <a:lumMod val="10000"/>
@@ -5997,7 +6002,7 @@
                 <a:latin typeface="Arial" panose="020B0604020202020204" pitchFamily="34" charset="0"/>
                 <a:cs typeface="Arial" panose="020B0604020202020204" pitchFamily="34" charset="0"/>
               </a:rPr>
-              <a:t>A major earthquake struck Ecuador on April 16, 2016 which effected sales prices for a number of weeks.</a:t>
+              <a:t>A major earthquake struck Ecuador on April 16, 2016 which effected sales prices for the subsequent weeks.</a:t>
             </a:r>
           </a:p>
           <a:p>
@@ -6550,7 +6555,7 @@
         <p:spPr>
           <a:xfrm>
             <a:off x="6492725" y="2710351"/>
-            <a:ext cx="2756177" cy="2441086"/>
+            <a:ext cx="2756177" cy="2620370"/>
           </a:xfrm>
           <a:prstGeom prst="rect">
             <a:avLst/>
@@ -6563,7 +6568,7 @@
         </p:spPr>
         <p:txBody>
           <a:bodyPr vert="horz" lIns="91440" tIns="45720" rIns="91440" bIns="45720" rtlCol="0" anchor="t">
-            <a:normAutofit/>
+            <a:normAutofit lnSpcReduction="10000"/>
           </a:bodyPr>
           <a:lstStyle>
             <a:lvl1pPr marL="0" indent="0" algn="ctr" defTabSz="914400" rtl="0" eaLnBrk="1" latinLnBrk="0" hangingPunct="1">
@@ -6732,19 +6737,19 @@
           <a:p>
             <a:pPr algn="l"/>
             <a:r>
-              <a:rPr lang="en-US" sz="1900" u="sng">
-                <a:solidFill>
-                  <a:schemeClr val="bg2">
-                    <a:lumMod val="10000"/>
-                  </a:schemeClr>
-                </a:solidFill>
-                <a:latin typeface="Arial" panose="020B0604020202020204" pitchFamily="34" charset="0"/>
-                <a:cs typeface="Arial" panose="020B0604020202020204" pitchFamily="34" charset="0"/>
-              </a:rPr>
-              <a:t>Predictions?</a:t>
-            </a:r>
-            <a:r>
-              <a:rPr lang="en-US" sz="2700">
+              <a:rPr lang="en-US" sz="1900" u="sng" dirty="0">
+                <a:solidFill>
+                  <a:schemeClr val="bg2">
+                    <a:lumMod val="10000"/>
+                  </a:schemeClr>
+                </a:solidFill>
+                <a:latin typeface="Arial" panose="020B0604020202020204" pitchFamily="34" charset="0"/>
+                <a:cs typeface="Arial" panose="020B0604020202020204" pitchFamily="34" charset="0"/>
+              </a:rPr>
+              <a:t>Sales</a:t>
+            </a:r>
+            <a:r>
+              <a:rPr lang="en-US" sz="1900" dirty="0">
                 <a:solidFill>
                   <a:schemeClr val="bg2">
                     <a:lumMod val="10000"/>
@@ -6755,19 +6760,34 @@
               </a:rPr>
               <a:t>:</a:t>
             </a:r>
-            <a:endParaRPr lang="en-US" sz="2700" dirty="0">
-              <a:solidFill>
-                <a:schemeClr val="bg2">
-                  <a:lumMod val="10000"/>
-                </a:schemeClr>
-              </a:solidFill>
-              <a:latin typeface="Arial" panose="020B0604020202020204" pitchFamily="34" charset="0"/>
-              <a:cs typeface="Arial" panose="020B0604020202020204" pitchFamily="34" charset="0"/>
-            </a:endParaRPr>
           </a:p>
           <a:p>
             <a:pPr algn="l"/>
-            <a:endParaRPr lang="en-US" sz="2700" dirty="0">
+            <a:r>
+              <a:rPr lang="en-US" sz="1400" dirty="0">
+                <a:solidFill>
+                  <a:schemeClr val="bg2">
+                    <a:lumMod val="10000"/>
+                  </a:schemeClr>
+                </a:solidFill>
+                <a:latin typeface="Arial" panose="020B0604020202020204" pitchFamily="34" charset="0"/>
+                <a:cs typeface="Arial" panose="020B0604020202020204" pitchFamily="34" charset="0"/>
+              </a:rPr>
+              <a:t>The target for prediction was the amount of sales. This varies according to the individual product types (e.g. gallons of beverages, pounds of produce, item counts, etc.), hence the broad variation in the graph above. However, the average shows clear general, yearly, and seasonal trends. Sales was also linearly dependent on number </a:t>
+            </a:r>
+            <a:r>
+              <a:rPr lang="en-US" sz="1400">
+                <a:solidFill>
+                  <a:schemeClr val="bg2">
+                    <a:lumMod val="10000"/>
+                  </a:schemeClr>
+                </a:solidFill>
+                <a:latin typeface="Arial" panose="020B0604020202020204" pitchFamily="34" charset="0"/>
+                <a:cs typeface="Arial" panose="020B0604020202020204" pitchFamily="34" charset="0"/>
+              </a:rPr>
+              <a:t>of transactions.</a:t>
+            </a:r>
+            <a:endParaRPr lang="en-US" sz="1400" dirty="0">
               <a:solidFill>
                 <a:schemeClr val="bg2">
                   <a:lumMod val="10000"/>

</xml_diff>